<commit_message>
Fixed typo in testing scripts where xlabel was total rather tha peak SNR
</commit_message>
<xml_diff>
--- a/Classification_of_Harmonics_Using_ML_v1.pptx
+++ b/Classification_of_Harmonics_Using_ML_v1.pptx
@@ -238,7 +238,7 @@
           <a:p>
             <a:fld id="{B960BEAE-160E-4B13-AB9A-070617351B29}" type="datetimeFigureOut">
               <a:rPr lang="en-US" smtClean="0"/>
-              <a:t>11/25/2023</a:t>
+              <a:t>11/28/2023</a:t>
             </a:fld>
             <a:endParaRPr lang="en-US"/>
           </a:p>
@@ -374,7 +374,7 @@
           <a:p>
             <a:fld id="{AE9BE8EE-E1F0-4C54-B5FB-A1536BDFFAE1}" type="datetimeFigureOut">
               <a:rPr lang="en-US" smtClean="0"/>
-              <a:t>11/25/2023</a:t>
+              <a:t>11/28/2023</a:t>
             </a:fld>
             <a:endParaRPr lang="en-US"/>
           </a:p>
@@ -915,7 +915,7 @@
           <a:p>
             <a:fld id="{9BC8F13F-5072-BC4F-865C-EC3B1C2735E4}" type="datetime1">
               <a:rPr lang="en-US" smtClean="0"/>
-              <a:t>11/25/2023</a:t>
+              <a:t>11/28/2023</a:t>
             </a:fld>
             <a:endParaRPr lang="en-US"/>
           </a:p>
@@ -1669,7 +1669,7 @@
           <a:p>
             <a:fld id="{53E1DC51-1B7A-A944-9C6B-274EADB1BE41}" type="datetime1">
               <a:rPr lang="en-US" smtClean="0"/>
-              <a:t>11/25/2023</a:t>
+              <a:t>11/28/2023</a:t>
             </a:fld>
             <a:endParaRPr lang="en-US"/>
           </a:p>
@@ -2519,7 +2519,7 @@
           <a:p>
             <a:fld id="{E21B64A7-DE03-2046-B594-D8BA697AD366}" type="datetime1">
               <a:rPr lang="en-US" smtClean="0"/>
-              <a:t>11/25/2023</a:t>
+              <a:t>11/28/2023</a:t>
             </a:fld>
             <a:endParaRPr lang="en-US"/>
           </a:p>
@@ -3335,7 +3335,7 @@
           <a:p>
             <a:fld id="{CC68C66A-A5CF-6E4B-8D6E-304EE31F1223}" type="datetime1">
               <a:rPr lang="en-US" smtClean="0"/>
-              <a:t>11/25/2023</a:t>
+              <a:t>11/28/2023</a:t>
             </a:fld>
             <a:endParaRPr lang="en-US"/>
           </a:p>
@@ -3674,7 +3674,7 @@
           <a:p>
             <a:fld id="{CFA0F1A2-C743-DF4B-B1B2-43B12730EFA7}" type="datetime1">
               <a:rPr lang="en-US" smtClean="0"/>
-              <a:t>11/25/2023</a:t>
+              <a:t>11/28/2023</a:t>
             </a:fld>
             <a:endParaRPr lang="en-US"/>
           </a:p>
@@ -4176,7 +4176,7 @@
           <a:p>
             <a:fld id="{75505AE6-8D37-5E4C-9234-859DB2EA2EE6}" type="datetime1">
               <a:rPr lang="en-US" smtClean="0"/>
-              <a:t>11/25/2023</a:t>
+              <a:t>11/28/2023</a:t>
             </a:fld>
             <a:endParaRPr lang="en-US"/>
           </a:p>
@@ -4555,7 +4555,7 @@
           <a:p>
             <a:fld id="{07A70B6D-844E-EE4B-A506-F2AE312E2A16}" type="datetime1">
               <a:rPr lang="en-US" smtClean="0"/>
-              <a:t>11/25/2023</a:t>
+              <a:t>11/28/2023</a:t>
             </a:fld>
             <a:endParaRPr lang="en-US"/>
           </a:p>
@@ -5021,7 +5021,7 @@
           <a:p>
             <a:fld id="{0BFB5C49-0C71-CE43-99CD-7F7521E7BE36}" type="datetime1">
               <a:rPr lang="en-US" smtClean="0"/>
-              <a:t>11/25/2023</a:t>
+              <a:t>11/28/2023</a:t>
             </a:fld>
             <a:endParaRPr lang="en-US"/>
           </a:p>
@@ -5426,7 +5426,7 @@
           <a:p>
             <a:fld id="{23E39EE5-4D19-6944-992E-18BD3A79A541}" type="datetime1">
               <a:rPr lang="en-US" smtClean="0"/>
-              <a:t>11/25/2023</a:t>
+              <a:t>11/28/2023</a:t>
             </a:fld>
             <a:endParaRPr lang="en-US"/>
           </a:p>
@@ -5749,7 +5749,7 @@
           <a:p>
             <a:fld id="{63A1F1F1-8D82-0248-9B10-3900E9FFC9FA}" type="datetime1">
               <a:rPr lang="en-US" smtClean="0"/>
-              <a:t>11/25/2023</a:t>
+              <a:t>11/28/2023</a:t>
             </a:fld>
             <a:endParaRPr lang="en-US"/>
           </a:p>
@@ -9465,6 +9465,9 @@
             <a:off x="1" y="134141"/>
             <a:ext cx="6069144" cy="615950"/>
           </a:xfrm>
+          <a:solidFill>
+            <a:schemeClr val="accent2"/>
+          </a:solidFill>
         </p:spPr>
         <p:txBody>
           <a:bodyPr/>
@@ -9499,6 +9502,9 @@
             <a:off x="6096000" y="134141"/>
             <a:ext cx="6095999" cy="615950"/>
           </a:xfrm>
+          <a:solidFill>
+            <a:schemeClr val="accent2"/>
+          </a:solidFill>
         </p:spPr>
         <p:txBody>
           <a:bodyPr/>
@@ -9799,6 +9805,43 @@
           </a:prstGeom>
         </p:spPr>
       </p:pic>
+      <p:sp>
+        <p:nvSpPr>
+          <p:cNvPr id="2" name="TextBox 1">
+            <a:extLst>
+              <a:ext uri="{FF2B5EF4-FFF2-40B4-BE49-F238E27FC236}">
+                <a16:creationId xmlns:a16="http://schemas.microsoft.com/office/drawing/2014/main" id="{1F9A9E1C-744D-E72B-7887-38AD5F654850}"/>
+              </a:ext>
+            </a:extLst>
+          </p:cNvPr>
+          <p:cNvSpPr txBox="1"/>
+          <p:nvPr/>
+        </p:nvSpPr>
+        <p:spPr>
+          <a:xfrm>
+            <a:off x="4080342" y="1939296"/>
+            <a:ext cx="4543231" cy="369332"/>
+          </a:xfrm>
+          <a:prstGeom prst="rect">
+            <a:avLst/>
+          </a:prstGeom>
+          <a:solidFill>
+            <a:schemeClr val="accent2"/>
+          </a:solidFill>
+        </p:spPr>
+        <p:txBody>
+          <a:bodyPr wrap="none" rtlCol="0">
+            <a:spAutoFit/>
+          </a:bodyPr>
+          <a:lstStyle/>
+          <a:p>
+            <a:r>
+              <a:rPr lang="en-US" dirty="0"/>
+              <a:t>Change x axis to peak SNR because you</a:t>
+            </a:r>
+          </a:p>
+        </p:txBody>
+      </p:sp>
     </p:spTree>
     <p:extLst>
       <p:ext uri="{BB962C8B-B14F-4D97-AF65-F5344CB8AC3E}">
@@ -11240,8 +11283,8 @@
           </a:prstGeom>
         </p:spPr>
       </p:pic>
-      <mc:AlternateContent xmlns:mc="http://schemas.openxmlformats.org/markup-compatibility/2006">
-        <mc:Choice xmlns:a14="http://schemas.microsoft.com/office/drawing/2010/main" Requires="a14">
+      <mc:AlternateContent xmlns:mc="http://schemas.openxmlformats.org/markup-compatibility/2006" xmlns:a14="http://schemas.microsoft.com/office/drawing/2010/main">
+        <mc:Choice Requires="a14">
           <p:sp>
             <p:nvSpPr>
               <p:cNvPr id="9" name="TextBox 8">
@@ -11284,6 +11327,7 @@
                               <a:solidFill>
                                 <a:schemeClr val="tx2"/>
                               </a:solidFill>
+                              <a:latin typeface="Cambria Math" panose="02040503050406030204" pitchFamily="18" charset="0"/>
                             </a:rPr>
                           </m:ctrlPr>
                         </m:sSubPr>
@@ -11293,6 +11337,7 @@
                               <a:solidFill>
                                 <a:schemeClr val="tx2"/>
                               </a:solidFill>
+                              <a:latin typeface="Cambria Math" panose="02040503050406030204" pitchFamily="18" charset="0"/>
                             </a:rPr>
                             <m:t>𝑓</m:t>
                           </m:r>
@@ -11303,6 +11348,7 @@
                               <a:solidFill>
                                 <a:schemeClr val="tx2"/>
                               </a:solidFill>
+                              <a:latin typeface="Cambria Math" panose="02040503050406030204" pitchFamily="18" charset="0"/>
                             </a:rPr>
                             <m:t>𝑠h𝑎𝑓𝑡</m:t>
                           </m:r>
@@ -11313,6 +11359,7 @@
                           <a:solidFill>
                             <a:schemeClr val="tx2"/>
                           </a:solidFill>
+                          <a:latin typeface="Cambria Math" panose="02040503050406030204" pitchFamily="18" charset="0"/>
                         </a:rPr>
                         <m:t>=</m:t>
                       </m:r>
@@ -11323,6 +11370,7 @@
                               <a:solidFill>
                                 <a:schemeClr val="tx2"/>
                               </a:solidFill>
+                              <a:latin typeface="Cambria Math" panose="02040503050406030204" pitchFamily="18" charset="0"/>
                             </a:rPr>
                           </m:ctrlPr>
                         </m:fPr>
@@ -11332,6 +11380,7 @@
                               <a:solidFill>
                                 <a:schemeClr val="tx2"/>
                               </a:solidFill>
+                              <a:latin typeface="Cambria Math" panose="02040503050406030204" pitchFamily="18" charset="0"/>
                             </a:rPr>
                             <m:t>𝑟𝑝𝑚</m:t>
                           </m:r>
@@ -11342,6 +11391,7 @@
                               <a:solidFill>
                                 <a:schemeClr val="tx2"/>
                               </a:solidFill>
+                              <a:latin typeface="Cambria Math" panose="02040503050406030204" pitchFamily="18" charset="0"/>
                             </a:rPr>
                             <m:t>60</m:t>
                           </m:r>
@@ -11371,6 +11421,7 @@
                               <a:solidFill>
                                 <a:schemeClr val="tx2"/>
                               </a:solidFill>
+                              <a:latin typeface="Cambria Math" panose="02040503050406030204" pitchFamily="18" charset="0"/>
                             </a:rPr>
                           </m:ctrlPr>
                         </m:sSubPr>
@@ -11380,6 +11431,7 @@
                               <a:solidFill>
                                 <a:schemeClr val="tx2"/>
                               </a:solidFill>
+                              <a:latin typeface="Cambria Math" panose="02040503050406030204" pitchFamily="18" charset="0"/>
                             </a:rPr>
                             <m:t>𝑓</m:t>
                           </m:r>
@@ -11390,6 +11442,7 @@
                               <a:solidFill>
                                 <a:schemeClr val="tx2"/>
                               </a:solidFill>
+                              <a:latin typeface="Cambria Math" panose="02040503050406030204" pitchFamily="18" charset="0"/>
                             </a:rPr>
                             <m:t>𝐸𝑀</m:t>
                           </m:r>
@@ -11400,6 +11453,7 @@
                           <a:solidFill>
                             <a:schemeClr val="tx2"/>
                           </a:solidFill>
+                          <a:latin typeface="Cambria Math" panose="02040503050406030204" pitchFamily="18" charset="0"/>
                         </a:rPr>
                         <m:t>=</m:t>
                       </m:r>
@@ -11410,6 +11464,7 @@
                               <a:solidFill>
                                 <a:schemeClr val="tx2"/>
                               </a:solidFill>
+                              <a:latin typeface="Cambria Math" panose="02040503050406030204" pitchFamily="18" charset="0"/>
                             </a:rPr>
                           </m:ctrlPr>
                         </m:fPr>
@@ -11419,6 +11474,7 @@
                               <a:solidFill>
                                 <a:schemeClr val="tx2"/>
                               </a:solidFill>
+                              <a:latin typeface="Cambria Math" panose="02040503050406030204" pitchFamily="18" charset="0"/>
                             </a:rPr>
                             <m:t>𝑁𝑃</m:t>
                           </m:r>
@@ -11427,6 +11483,7 @@
                               <a:solidFill>
                                 <a:schemeClr val="tx2"/>
                               </a:solidFill>
+                              <a:latin typeface="Cambria Math" panose="02040503050406030204" pitchFamily="18" charset="0"/>
                             </a:rPr>
                             <m:t>∗</m:t>
                           </m:r>
@@ -11435,6 +11492,7 @@
                               <a:solidFill>
                                 <a:schemeClr val="tx2"/>
                               </a:solidFill>
+                              <a:latin typeface="Cambria Math" panose="02040503050406030204" pitchFamily="18" charset="0"/>
                             </a:rPr>
                             <m:t>𝑅𝑃𝑀</m:t>
                           </m:r>
@@ -11445,6 +11503,7 @@
                               <a:solidFill>
                                 <a:schemeClr val="tx2"/>
                               </a:solidFill>
+                              <a:latin typeface="Cambria Math" panose="02040503050406030204" pitchFamily="18" charset="0"/>
                             </a:rPr>
                             <m:t>120</m:t>
                           </m:r>
@@ -11474,6 +11533,7 @@
                               <a:solidFill>
                                 <a:schemeClr val="tx2"/>
                               </a:solidFill>
+                              <a:latin typeface="Cambria Math" panose="02040503050406030204" pitchFamily="18" charset="0"/>
                             </a:rPr>
                           </m:ctrlPr>
                         </m:sSubPr>
@@ -11483,6 +11543,7 @@
                               <a:solidFill>
                                 <a:schemeClr val="tx2"/>
                               </a:solidFill>
+                              <a:latin typeface="Cambria Math" panose="02040503050406030204" pitchFamily="18" charset="0"/>
                             </a:rPr>
                             <m:t>𝑓</m:t>
                           </m:r>
@@ -11493,6 +11554,7 @@
                               <a:solidFill>
                                 <a:schemeClr val="tx2"/>
                               </a:solidFill>
+                              <a:latin typeface="Cambria Math" panose="02040503050406030204" pitchFamily="18" charset="0"/>
                             </a:rPr>
                             <m:t>𝐹𝑇𝐹</m:t>
                           </m:r>
@@ -11503,6 +11565,7 @@
                           <a:solidFill>
                             <a:schemeClr val="tx2"/>
                           </a:solidFill>
+                          <a:latin typeface="Cambria Math" panose="02040503050406030204" pitchFamily="18" charset="0"/>
                         </a:rPr>
                         <m:t>=</m:t>
                       </m:r>
@@ -11513,6 +11576,7 @@
                               <a:solidFill>
                                 <a:schemeClr val="tx2"/>
                               </a:solidFill>
+                              <a:latin typeface="Cambria Math" panose="02040503050406030204" pitchFamily="18" charset="0"/>
                             </a:rPr>
                           </m:ctrlPr>
                         </m:fPr>
@@ -11522,6 +11586,7 @@
                               <a:solidFill>
                                 <a:schemeClr val="tx2"/>
                               </a:solidFill>
+                              <a:latin typeface="Cambria Math" panose="02040503050406030204" pitchFamily="18" charset="0"/>
                             </a:rPr>
                             <m:t>𝑟𝑝𝑠</m:t>
                           </m:r>
@@ -11532,6 +11597,7 @@
                               <a:solidFill>
                                 <a:schemeClr val="tx2"/>
                               </a:solidFill>
+                              <a:latin typeface="Cambria Math" panose="02040503050406030204" pitchFamily="18" charset="0"/>
                             </a:rPr>
                             <m:t>2</m:t>
                           </m:r>
@@ -11542,6 +11608,7 @@
                           <a:solidFill>
                             <a:schemeClr val="tx2"/>
                           </a:solidFill>
+                          <a:latin typeface="Cambria Math" panose="02040503050406030204" pitchFamily="18" charset="0"/>
                         </a:rPr>
                         <m:t>∗</m:t>
                       </m:r>
@@ -11552,6 +11619,7 @@
                               <a:solidFill>
                                 <a:schemeClr val="tx2"/>
                               </a:solidFill>
+                              <a:latin typeface="Cambria Math" panose="02040503050406030204" pitchFamily="18" charset="0"/>
                             </a:rPr>
                           </m:ctrlPr>
                         </m:dPr>
@@ -11561,6 +11629,7 @@
                               <a:solidFill>
                                 <a:schemeClr val="tx2"/>
                               </a:solidFill>
+                              <a:latin typeface="Cambria Math" panose="02040503050406030204" pitchFamily="18" charset="0"/>
                             </a:rPr>
                             <m:t>1−</m:t>
                           </m:r>
@@ -11571,6 +11640,7 @@
                                   <a:solidFill>
                                     <a:schemeClr val="tx2"/>
                                   </a:solidFill>
+                                  <a:latin typeface="Cambria Math" panose="02040503050406030204" pitchFamily="18" charset="0"/>
                                 </a:rPr>
                               </m:ctrlPr>
                             </m:fPr>
@@ -11580,6 +11650,7 @@
                                   <a:solidFill>
                                     <a:schemeClr val="tx2"/>
                                   </a:solidFill>
+                                  <a:latin typeface="Cambria Math" panose="02040503050406030204" pitchFamily="18" charset="0"/>
                                 </a:rPr>
                                 <m:t>𝐵𝑑</m:t>
                               </m:r>
@@ -11590,6 +11661,7 @@
                                   <a:solidFill>
                                     <a:schemeClr val="tx2"/>
                                   </a:solidFill>
+                                  <a:latin typeface="Cambria Math" panose="02040503050406030204" pitchFamily="18" charset="0"/>
                                 </a:rPr>
                                 <m:t>𝑃𝑑</m:t>
                               </m:r>
@@ -11602,6 +11674,7 @@
                                   <a:solidFill>
                                     <a:schemeClr val="tx2"/>
                                   </a:solidFill>
+                                  <a:latin typeface="Cambria Math" panose="02040503050406030204" pitchFamily="18" charset="0"/>
                                 </a:rPr>
                               </m:ctrlPr>
                             </m:funcPr>
@@ -11614,6 +11687,7 @@
                                   <a:solidFill>
                                     <a:schemeClr val="tx2"/>
                                   </a:solidFill>
+                                  <a:latin typeface="Cambria Math" panose="02040503050406030204" pitchFamily="18" charset="0"/>
                                 </a:rPr>
                                 <m:t>cos</m:t>
                               </m:r>
@@ -11624,6 +11698,7 @@
                                   <a:solidFill>
                                     <a:schemeClr val="tx2"/>
                                   </a:solidFill>
+                                  <a:latin typeface="Cambria Math" panose="02040503050406030204" pitchFamily="18" charset="0"/>
                                 </a:rPr>
                                 <m:t>𝜙</m:t>
                               </m:r>
@@ -11655,6 +11730,7 @@
                               <a:solidFill>
                                 <a:schemeClr val="tx2"/>
                               </a:solidFill>
+                              <a:latin typeface="Cambria Math" panose="02040503050406030204" pitchFamily="18" charset="0"/>
                             </a:rPr>
                           </m:ctrlPr>
                         </m:sSubPr>
@@ -11664,6 +11740,7 @@
                               <a:solidFill>
                                 <a:schemeClr val="tx2"/>
                               </a:solidFill>
+                              <a:latin typeface="Cambria Math" panose="02040503050406030204" pitchFamily="18" charset="0"/>
                             </a:rPr>
                             <m:t>𝑓</m:t>
                           </m:r>
@@ -11674,6 +11751,7 @@
                               <a:solidFill>
                                 <a:schemeClr val="tx2"/>
                               </a:solidFill>
+                              <a:latin typeface="Cambria Math" panose="02040503050406030204" pitchFamily="18" charset="0"/>
                             </a:rPr>
                             <m:t>𝐵𝑃𝐹𝐼</m:t>
                           </m:r>
@@ -11684,6 +11762,7 @@
                           <a:solidFill>
                             <a:schemeClr val="tx2"/>
                           </a:solidFill>
+                          <a:latin typeface="Cambria Math" panose="02040503050406030204" pitchFamily="18" charset="0"/>
                         </a:rPr>
                         <m:t>=</m:t>
                       </m:r>
@@ -11694,6 +11773,7 @@
                               <a:solidFill>
                                 <a:schemeClr val="tx2"/>
                               </a:solidFill>
+                              <a:latin typeface="Cambria Math" panose="02040503050406030204" pitchFamily="18" charset="0"/>
                             </a:rPr>
                           </m:ctrlPr>
                         </m:fPr>
@@ -11703,6 +11783,7 @@
                               <a:solidFill>
                                 <a:schemeClr val="tx2"/>
                               </a:solidFill>
+                              <a:latin typeface="Cambria Math" panose="02040503050406030204" pitchFamily="18" charset="0"/>
                             </a:rPr>
                             <m:t>𝑁𝑏</m:t>
                           </m:r>
@@ -11713,6 +11794,7 @@
                               <a:solidFill>
                                 <a:schemeClr val="tx2"/>
                               </a:solidFill>
+                              <a:latin typeface="Cambria Math" panose="02040503050406030204" pitchFamily="18" charset="0"/>
                             </a:rPr>
                             <m:t>2</m:t>
                           </m:r>
@@ -11723,6 +11805,7 @@
                           <a:solidFill>
                             <a:schemeClr val="tx2"/>
                           </a:solidFill>
+                          <a:latin typeface="Cambria Math" panose="02040503050406030204" pitchFamily="18" charset="0"/>
                         </a:rPr>
                         <m:t>∗</m:t>
                       </m:r>
@@ -11731,6 +11814,7 @@
                           <a:solidFill>
                             <a:schemeClr val="tx2"/>
                           </a:solidFill>
+                          <a:latin typeface="Cambria Math" panose="02040503050406030204" pitchFamily="18" charset="0"/>
                         </a:rPr>
                         <m:t>𝑟𝑝𝑠</m:t>
                       </m:r>
@@ -11739,6 +11823,7 @@
                           <a:solidFill>
                             <a:schemeClr val="tx2"/>
                           </a:solidFill>
+                          <a:latin typeface="Cambria Math" panose="02040503050406030204" pitchFamily="18" charset="0"/>
                         </a:rPr>
                         <m:t>∗</m:t>
                       </m:r>
@@ -11749,6 +11834,7 @@
                               <a:solidFill>
                                 <a:schemeClr val="tx2"/>
                               </a:solidFill>
+                              <a:latin typeface="Cambria Math" panose="02040503050406030204" pitchFamily="18" charset="0"/>
                             </a:rPr>
                           </m:ctrlPr>
                         </m:dPr>
@@ -11758,6 +11844,7 @@
                               <a:solidFill>
                                 <a:schemeClr val="tx2"/>
                               </a:solidFill>
+                              <a:latin typeface="Cambria Math" panose="02040503050406030204" pitchFamily="18" charset="0"/>
                             </a:rPr>
                             <m:t>1</m:t>
                           </m:r>
@@ -11766,6 +11853,7 @@
                               <a:solidFill>
                                 <a:schemeClr val="tx2"/>
                               </a:solidFill>
+                              <a:latin typeface="Cambria Math" panose="02040503050406030204" pitchFamily="18" charset="0"/>
                             </a:rPr>
                             <m:t>+</m:t>
                           </m:r>
@@ -11776,6 +11864,7 @@
                                   <a:solidFill>
                                     <a:schemeClr val="tx2"/>
                                   </a:solidFill>
+                                  <a:latin typeface="Cambria Math" panose="02040503050406030204" pitchFamily="18" charset="0"/>
                                 </a:rPr>
                               </m:ctrlPr>
                             </m:fPr>
@@ -11785,6 +11874,7 @@
                                   <a:solidFill>
                                     <a:schemeClr val="tx2"/>
                                   </a:solidFill>
+                                  <a:latin typeface="Cambria Math" panose="02040503050406030204" pitchFamily="18" charset="0"/>
                                 </a:rPr>
                                 <m:t>𝐵𝑑</m:t>
                               </m:r>
@@ -11795,6 +11885,7 @@
                                   <a:solidFill>
                                     <a:schemeClr val="tx2"/>
                                   </a:solidFill>
+                                  <a:latin typeface="Cambria Math" panose="02040503050406030204" pitchFamily="18" charset="0"/>
                                 </a:rPr>
                                 <m:t>𝑃𝑑</m:t>
                               </m:r>
@@ -11807,6 +11898,7 @@
                                   <a:solidFill>
                                     <a:schemeClr val="tx2"/>
                                   </a:solidFill>
+                                  <a:latin typeface="Cambria Math" panose="02040503050406030204" pitchFamily="18" charset="0"/>
                                 </a:rPr>
                               </m:ctrlPr>
                             </m:funcPr>
@@ -11819,6 +11911,7 @@
                                   <a:solidFill>
                                     <a:schemeClr val="tx2"/>
                                   </a:solidFill>
+                                  <a:latin typeface="Cambria Math" panose="02040503050406030204" pitchFamily="18" charset="0"/>
                                 </a:rPr>
                                 <m:t>cos</m:t>
                               </m:r>
@@ -11829,6 +11922,7 @@
                                   <a:solidFill>
                                     <a:schemeClr val="tx2"/>
                                   </a:solidFill>
+                                  <a:latin typeface="Cambria Math" panose="02040503050406030204" pitchFamily="18" charset="0"/>
                                 </a:rPr>
                                 <m:t>𝜙</m:t>
                               </m:r>
@@ -11860,6 +11954,7 @@
                               <a:solidFill>
                                 <a:schemeClr val="tx2"/>
                               </a:solidFill>
+                              <a:latin typeface="Cambria Math" panose="02040503050406030204" pitchFamily="18" charset="0"/>
                             </a:rPr>
                           </m:ctrlPr>
                         </m:sSubPr>
@@ -11869,6 +11964,7 @@
                               <a:solidFill>
                                 <a:schemeClr val="tx2"/>
                               </a:solidFill>
+                              <a:latin typeface="Cambria Math" panose="02040503050406030204" pitchFamily="18" charset="0"/>
                             </a:rPr>
                             <m:t>𝑓</m:t>
                           </m:r>
@@ -11879,6 +11975,7 @@
                               <a:solidFill>
                                 <a:schemeClr val="tx2"/>
                               </a:solidFill>
+                              <a:latin typeface="Cambria Math" panose="02040503050406030204" pitchFamily="18" charset="0"/>
                             </a:rPr>
                             <m:t>𝐵𝑃𝐹𝑂</m:t>
                           </m:r>
@@ -11889,6 +11986,7 @@
                           <a:solidFill>
                             <a:schemeClr val="tx2"/>
                           </a:solidFill>
+                          <a:latin typeface="Cambria Math" panose="02040503050406030204" pitchFamily="18" charset="0"/>
                         </a:rPr>
                         <m:t>=</m:t>
                       </m:r>
@@ -11899,6 +11997,7 @@
                               <a:solidFill>
                                 <a:schemeClr val="tx2"/>
                               </a:solidFill>
+                              <a:latin typeface="Cambria Math" panose="02040503050406030204" pitchFamily="18" charset="0"/>
                             </a:rPr>
                           </m:ctrlPr>
                         </m:fPr>
@@ -11908,6 +12007,7 @@
                               <a:solidFill>
                                 <a:schemeClr val="tx2"/>
                               </a:solidFill>
+                              <a:latin typeface="Cambria Math" panose="02040503050406030204" pitchFamily="18" charset="0"/>
                             </a:rPr>
                             <m:t>𝑁𝑏</m:t>
                           </m:r>
@@ -11918,6 +12018,7 @@
                               <a:solidFill>
                                 <a:schemeClr val="tx2"/>
                               </a:solidFill>
+                              <a:latin typeface="Cambria Math" panose="02040503050406030204" pitchFamily="18" charset="0"/>
                             </a:rPr>
                             <m:t>2</m:t>
                           </m:r>
@@ -11928,6 +12029,7 @@
                           <a:solidFill>
                             <a:schemeClr val="tx2"/>
                           </a:solidFill>
+                          <a:latin typeface="Cambria Math" panose="02040503050406030204" pitchFamily="18" charset="0"/>
                         </a:rPr>
                         <m:t>∗</m:t>
                       </m:r>
@@ -11936,6 +12038,7 @@
                           <a:solidFill>
                             <a:schemeClr val="tx2"/>
                           </a:solidFill>
+                          <a:latin typeface="Cambria Math" panose="02040503050406030204" pitchFamily="18" charset="0"/>
                         </a:rPr>
                         <m:t>𝑟𝑝𝑠</m:t>
                       </m:r>
@@ -11944,6 +12047,7 @@
                           <a:solidFill>
                             <a:schemeClr val="tx2"/>
                           </a:solidFill>
+                          <a:latin typeface="Cambria Math" panose="02040503050406030204" pitchFamily="18" charset="0"/>
                         </a:rPr>
                         <m:t>∗</m:t>
                       </m:r>
@@ -11954,6 +12058,7 @@
                               <a:solidFill>
                                 <a:schemeClr val="tx2"/>
                               </a:solidFill>
+                              <a:latin typeface="Cambria Math" panose="02040503050406030204" pitchFamily="18" charset="0"/>
                             </a:rPr>
                           </m:ctrlPr>
                         </m:dPr>
@@ -11963,6 +12068,7 @@
                               <a:solidFill>
                                 <a:schemeClr val="tx2"/>
                               </a:solidFill>
+                              <a:latin typeface="Cambria Math" panose="02040503050406030204" pitchFamily="18" charset="0"/>
                             </a:rPr>
                             <m:t>1−</m:t>
                           </m:r>
@@ -11973,6 +12079,7 @@
                                   <a:solidFill>
                                     <a:schemeClr val="tx2"/>
                                   </a:solidFill>
+                                  <a:latin typeface="Cambria Math" panose="02040503050406030204" pitchFamily="18" charset="0"/>
                                 </a:rPr>
                               </m:ctrlPr>
                             </m:fPr>
@@ -11982,6 +12089,7 @@
                                   <a:solidFill>
                                     <a:schemeClr val="tx2"/>
                                   </a:solidFill>
+                                  <a:latin typeface="Cambria Math" panose="02040503050406030204" pitchFamily="18" charset="0"/>
                                 </a:rPr>
                                 <m:t>𝐵𝑑</m:t>
                               </m:r>
@@ -11992,6 +12100,7 @@
                                   <a:solidFill>
                                     <a:schemeClr val="tx2"/>
                                   </a:solidFill>
+                                  <a:latin typeface="Cambria Math" panose="02040503050406030204" pitchFamily="18" charset="0"/>
                                 </a:rPr>
                                 <m:t>𝑃𝑑</m:t>
                               </m:r>
@@ -12004,6 +12113,7 @@
                                   <a:solidFill>
                                     <a:schemeClr val="tx2"/>
                                   </a:solidFill>
+                                  <a:latin typeface="Cambria Math" panose="02040503050406030204" pitchFamily="18" charset="0"/>
                                 </a:rPr>
                               </m:ctrlPr>
                             </m:funcPr>
@@ -12016,6 +12126,7 @@
                                   <a:solidFill>
                                     <a:schemeClr val="tx2"/>
                                   </a:solidFill>
+                                  <a:latin typeface="Cambria Math" panose="02040503050406030204" pitchFamily="18" charset="0"/>
                                 </a:rPr>
                                 <m:t>cos</m:t>
                               </m:r>
@@ -12026,6 +12137,7 @@
                                   <a:solidFill>
                                     <a:schemeClr val="tx2"/>
                                   </a:solidFill>
+                                  <a:latin typeface="Cambria Math" panose="02040503050406030204" pitchFamily="18" charset="0"/>
                                 </a:rPr>
                                 <m:t>𝜙</m:t>
                               </m:r>
@@ -12057,6 +12169,7 @@
                               <a:solidFill>
                                 <a:schemeClr val="tx2"/>
                               </a:solidFill>
+                              <a:latin typeface="Cambria Math" panose="02040503050406030204" pitchFamily="18" charset="0"/>
                             </a:rPr>
                           </m:ctrlPr>
                         </m:sSubPr>
@@ -12066,6 +12179,7 @@
                               <a:solidFill>
                                 <a:schemeClr val="tx2"/>
                               </a:solidFill>
+                              <a:latin typeface="Cambria Math" panose="02040503050406030204" pitchFamily="18" charset="0"/>
                             </a:rPr>
                             <m:t>𝑓</m:t>
                           </m:r>
@@ -12076,6 +12190,7 @@
                               <a:solidFill>
                                 <a:schemeClr val="tx2"/>
                               </a:solidFill>
+                              <a:latin typeface="Cambria Math" panose="02040503050406030204" pitchFamily="18" charset="0"/>
                             </a:rPr>
                             <m:t>𝐵𝑆𝐹</m:t>
                           </m:r>
@@ -12086,6 +12201,7 @@
                           <a:solidFill>
                             <a:schemeClr val="tx2"/>
                           </a:solidFill>
+                          <a:latin typeface="Cambria Math" panose="02040503050406030204" pitchFamily="18" charset="0"/>
                         </a:rPr>
                         <m:t>=</m:t>
                       </m:r>
@@ -12096,6 +12212,7 @@
                               <a:solidFill>
                                 <a:schemeClr val="tx2"/>
                               </a:solidFill>
+                              <a:latin typeface="Cambria Math" panose="02040503050406030204" pitchFamily="18" charset="0"/>
                             </a:rPr>
                           </m:ctrlPr>
                         </m:fPr>
@@ -12105,6 +12222,7 @@
                               <a:solidFill>
                                 <a:schemeClr val="tx2"/>
                               </a:solidFill>
+                              <a:latin typeface="Cambria Math" panose="02040503050406030204" pitchFamily="18" charset="0"/>
                             </a:rPr>
                             <m:t>𝑃𝑑</m:t>
                           </m:r>
@@ -12115,6 +12233,7 @@
                               <a:solidFill>
                                 <a:schemeClr val="tx2"/>
                               </a:solidFill>
+                              <a:latin typeface="Cambria Math" panose="02040503050406030204" pitchFamily="18" charset="0"/>
                             </a:rPr>
                             <m:t>2</m:t>
                           </m:r>
@@ -12123,6 +12242,7 @@
                               <a:solidFill>
                                 <a:schemeClr val="tx2"/>
                               </a:solidFill>
+                              <a:latin typeface="Cambria Math" panose="02040503050406030204" pitchFamily="18" charset="0"/>
                             </a:rPr>
                             <m:t>∗</m:t>
                           </m:r>
@@ -12131,6 +12251,7 @@
                               <a:solidFill>
                                 <a:schemeClr val="tx2"/>
                               </a:solidFill>
+                              <a:latin typeface="Cambria Math" panose="02040503050406030204" pitchFamily="18" charset="0"/>
                             </a:rPr>
                             <m:t>𝐵𝑑</m:t>
                           </m:r>
@@ -12141,6 +12262,7 @@
                           <a:solidFill>
                             <a:schemeClr val="tx2"/>
                           </a:solidFill>
+                          <a:latin typeface="Cambria Math" panose="02040503050406030204" pitchFamily="18" charset="0"/>
                         </a:rPr>
                         <m:t>∗</m:t>
                       </m:r>
@@ -12149,6 +12271,7 @@
                           <a:solidFill>
                             <a:schemeClr val="tx2"/>
                           </a:solidFill>
+                          <a:latin typeface="Cambria Math" panose="02040503050406030204" pitchFamily="18" charset="0"/>
                         </a:rPr>
                         <m:t>𝑟𝑝𝑠</m:t>
                       </m:r>
@@ -12157,6 +12280,7 @@
                           <a:solidFill>
                             <a:schemeClr val="tx2"/>
                           </a:solidFill>
+                          <a:latin typeface="Cambria Math" panose="02040503050406030204" pitchFamily="18" charset="0"/>
                         </a:rPr>
                         <m:t>∗</m:t>
                       </m:r>
@@ -12167,6 +12291,7 @@
                               <a:solidFill>
                                 <a:schemeClr val="tx2"/>
                               </a:solidFill>
+                              <a:latin typeface="Cambria Math" panose="02040503050406030204" pitchFamily="18" charset="0"/>
                             </a:rPr>
                           </m:ctrlPr>
                         </m:dPr>
@@ -12176,6 +12301,7 @@
                               <a:solidFill>
                                 <a:schemeClr val="tx2"/>
                               </a:solidFill>
+                              <a:latin typeface="Cambria Math" panose="02040503050406030204" pitchFamily="18" charset="0"/>
                             </a:rPr>
                             <m:t>1−</m:t>
                           </m:r>
@@ -12186,6 +12312,7 @@
                                   <a:solidFill>
                                     <a:schemeClr val="tx2"/>
                                   </a:solidFill>
+                                  <a:latin typeface="Cambria Math" panose="02040503050406030204" pitchFamily="18" charset="0"/>
                                 </a:rPr>
                               </m:ctrlPr>
                             </m:sSupPr>
@@ -12197,6 +12324,7 @@
                                       <a:solidFill>
                                         <a:schemeClr val="tx2"/>
                                       </a:solidFill>
+                                      <a:latin typeface="Cambria Math" panose="02040503050406030204" pitchFamily="18" charset="0"/>
                                     </a:rPr>
                                   </m:ctrlPr>
                                 </m:dPr>
@@ -12208,6 +12336,7 @@
                                           <a:solidFill>
                                             <a:schemeClr val="tx2"/>
                                           </a:solidFill>
+                                          <a:latin typeface="Cambria Math" panose="02040503050406030204" pitchFamily="18" charset="0"/>
                                         </a:rPr>
                                       </m:ctrlPr>
                                     </m:fPr>
@@ -12217,6 +12346,7 @@
                                           <a:solidFill>
                                             <a:schemeClr val="tx2"/>
                                           </a:solidFill>
+                                          <a:latin typeface="Cambria Math" panose="02040503050406030204" pitchFamily="18" charset="0"/>
                                         </a:rPr>
                                         <m:t>𝐵𝑑</m:t>
                                       </m:r>
@@ -12227,6 +12357,7 @@
                                           <a:solidFill>
                                             <a:schemeClr val="tx2"/>
                                           </a:solidFill>
+                                          <a:latin typeface="Cambria Math" panose="02040503050406030204" pitchFamily="18" charset="0"/>
                                         </a:rPr>
                                         <m:t>𝑃𝑑</m:t>
                                       </m:r>
@@ -12241,6 +12372,7 @@
                                   <a:solidFill>
                                     <a:schemeClr val="tx2"/>
                                   </a:solidFill>
+                                  <a:latin typeface="Cambria Math" panose="02040503050406030204" pitchFamily="18" charset="0"/>
                                 </a:rPr>
                                 <m:t>2</m:t>
                               </m:r>
@@ -12253,6 +12385,7 @@
                                   <a:solidFill>
                                     <a:schemeClr val="tx2"/>
                                   </a:solidFill>
+                                  <a:latin typeface="Cambria Math" panose="02040503050406030204" pitchFamily="18" charset="0"/>
                                 </a:rPr>
                               </m:ctrlPr>
                             </m:funcPr>
@@ -12264,6 +12397,7 @@
                                       <a:solidFill>
                                         <a:schemeClr val="tx2"/>
                                       </a:solidFill>
+                                      <a:latin typeface="Cambria Math" panose="02040503050406030204" pitchFamily="18" charset="0"/>
                                     </a:rPr>
                                   </m:ctrlPr>
                                 </m:sSupPr>
@@ -12276,6 +12410,7 @@
                                       <a:solidFill>
                                         <a:schemeClr val="tx2"/>
                                       </a:solidFill>
+                                      <a:latin typeface="Cambria Math" panose="02040503050406030204" pitchFamily="18" charset="0"/>
                                     </a:rPr>
                                     <m:t>cos</m:t>
                                   </m:r>
@@ -12286,6 +12421,7 @@
                                       <a:solidFill>
                                         <a:schemeClr val="tx2"/>
                                       </a:solidFill>
+                                      <a:latin typeface="Cambria Math" panose="02040503050406030204" pitchFamily="18" charset="0"/>
                                     </a:rPr>
                                     <m:t>2</m:t>
                                   </m:r>
@@ -12298,6 +12434,7 @@
                                   <a:solidFill>
                                     <a:schemeClr val="tx2"/>
                                   </a:solidFill>
+                                  <a:latin typeface="Cambria Math" panose="02040503050406030204" pitchFamily="18" charset="0"/>
                                 </a:rPr>
                                 <m:t>𝜙</m:t>
                               </m:r>
@@ -12317,7 +12454,7 @@
             </p:txBody>
           </p:sp>
         </mc:Choice>
-        <mc:Fallback>
+        <mc:Fallback xmlns="">
           <p:sp>
             <p:nvSpPr>
               <p:cNvPr id="9" name="TextBox 8">
@@ -12362,8 +12499,8 @@
           </p:sp>
         </mc:Fallback>
       </mc:AlternateContent>
-      <mc:AlternateContent xmlns:mc="http://schemas.openxmlformats.org/markup-compatibility/2006">
-        <mc:Choice xmlns:a14="http://schemas.microsoft.com/office/drawing/2010/main" Requires="a14">
+      <mc:AlternateContent xmlns:mc="http://schemas.openxmlformats.org/markup-compatibility/2006" xmlns:a14="http://schemas.microsoft.com/office/drawing/2010/main">
+        <mc:Choice Requires="a14">
           <p:sp>
             <p:nvSpPr>
               <p:cNvPr id="11" name="TextBox 10">
@@ -12399,6 +12536,7 @@
                         <a:solidFill>
                           <a:schemeClr val="tx2"/>
                         </a:solidFill>
+                        <a:latin typeface="Cambria Math" panose="02040503050406030204" pitchFamily="18" charset="0"/>
                       </a:rPr>
                       <m:t>𝐵𝑃𝐹𝑂</m:t>
                     </m:r>
@@ -12421,6 +12559,7 @@
                         <a:solidFill>
                           <a:schemeClr val="tx2"/>
                         </a:solidFill>
+                        <a:latin typeface="Cambria Math" panose="02040503050406030204" pitchFamily="18" charset="0"/>
                       </a:rPr>
                       <m:t>𝐵𝑆𝐹</m:t>
                     </m:r>
@@ -12443,6 +12582,7 @@
                         <a:solidFill>
                           <a:schemeClr val="tx2"/>
                         </a:solidFill>
+                        <a:latin typeface="Cambria Math" panose="02040503050406030204" pitchFamily="18" charset="0"/>
                       </a:rPr>
                       <m:t>𝑏𝑑</m:t>
                     </m:r>
@@ -12465,16 +12605,9 @@
                         <a:solidFill>
                           <a:schemeClr val="tx2"/>
                         </a:solidFill>
+                        <a:latin typeface="Cambria Math" panose="02040503050406030204" pitchFamily="18" charset="0"/>
                       </a:rPr>
-                      <m:t>𝑁</m:t>
-                    </m:r>
-                    <m:r>
-                      <a:rPr lang="en-US" sz="1200" i="1" dirty="0" smtClean="0">
-                        <a:solidFill>
-                          <a:schemeClr val="tx2"/>
-                        </a:solidFill>
-                      </a:rPr>
-                      <m:t>𝑏</m:t>
+                      <m:t>𝑁𝑏</m:t>
                     </m:r>
                   </m:oMath>
                 </a14:m>
@@ -12495,6 +12628,7 @@
                         <a:solidFill>
                           <a:schemeClr val="tx2"/>
                         </a:solidFill>
+                        <a:latin typeface="Cambria Math" panose="02040503050406030204" pitchFamily="18" charset="0"/>
                       </a:rPr>
                       <m:t>𝑃𝑑</m:t>
                     </m:r>
@@ -12517,6 +12651,7 @@
                         <a:solidFill>
                           <a:schemeClr val="tx2"/>
                         </a:solidFill>
+                        <a:latin typeface="Cambria Math" panose="02040503050406030204" pitchFamily="18" charset="0"/>
                       </a:rPr>
                       <m:t>𝜙</m:t>
                     </m:r>
@@ -12534,7 +12669,7 @@
             </p:txBody>
           </p:sp>
         </mc:Choice>
-        <mc:Fallback>
+        <mc:Fallback xmlns="">
           <p:sp>
             <p:nvSpPr>
               <p:cNvPr id="11" name="TextBox 10">
@@ -12579,8 +12714,8 @@
           </p:sp>
         </mc:Fallback>
       </mc:AlternateContent>
-      <mc:AlternateContent xmlns:mc="http://schemas.openxmlformats.org/markup-compatibility/2006">
-        <mc:Choice xmlns:a14="http://schemas.microsoft.com/office/drawing/2010/main" Requires="a14">
+      <mc:AlternateContent xmlns:mc="http://schemas.openxmlformats.org/markup-compatibility/2006" xmlns:a14="http://schemas.microsoft.com/office/drawing/2010/main">
+        <mc:Choice Requires="a14">
           <p:sp>
             <p:nvSpPr>
               <p:cNvPr id="18" name="TextBox 17">
@@ -12616,6 +12751,7 @@
                         <a:solidFill>
                           <a:schemeClr val="tx2"/>
                         </a:solidFill>
+                        <a:latin typeface="Cambria Math" panose="02040503050406030204" pitchFamily="18" charset="0"/>
                       </a:rPr>
                       <m:t>𝑓</m:t>
                     </m:r>
@@ -12638,6 +12774,7 @@
                         <a:solidFill>
                           <a:schemeClr val="tx2"/>
                         </a:solidFill>
+                        <a:latin typeface="Cambria Math" panose="02040503050406030204" pitchFamily="18" charset="0"/>
                       </a:rPr>
                       <m:t>𝑟𝑝𝑚</m:t>
                     </m:r>
@@ -12660,6 +12797,7 @@
                         <a:solidFill>
                           <a:schemeClr val="tx2"/>
                         </a:solidFill>
+                        <a:latin typeface="Cambria Math" panose="02040503050406030204" pitchFamily="18" charset="0"/>
                       </a:rPr>
                       <m:t>𝑟𝑝𝑠</m:t>
                     </m:r>
@@ -12682,6 +12820,7 @@
                         <a:solidFill>
                           <a:schemeClr val="tx2"/>
                         </a:solidFill>
+                        <a:latin typeface="Cambria Math" panose="02040503050406030204" pitchFamily="18" charset="0"/>
                       </a:rPr>
                       <m:t>𝑁𝑃</m:t>
                     </m:r>
@@ -12704,16 +12843,9 @@
                         <a:solidFill>
                           <a:schemeClr val="tx2"/>
                         </a:solidFill>
+                        <a:latin typeface="Cambria Math" panose="02040503050406030204" pitchFamily="18" charset="0"/>
                       </a:rPr>
-                      <m:t>𝐹𝑇</m:t>
-                    </m:r>
-                    <m:r>
-                      <a:rPr lang="en-US" sz="1200" i="1" dirty="0" smtClean="0">
-                        <a:solidFill>
-                          <a:schemeClr val="tx2"/>
-                        </a:solidFill>
-                      </a:rPr>
-                      <m:t>𝐹</m:t>
+                      <m:t>𝐹𝑇𝐹</m:t>
                     </m:r>
                   </m:oMath>
                 </a14:m>
@@ -12734,6 +12866,7 @@
                         <a:solidFill>
                           <a:schemeClr val="tx2"/>
                         </a:solidFill>
+                        <a:latin typeface="Cambria Math" panose="02040503050406030204" pitchFamily="18" charset="0"/>
                       </a:rPr>
                       <m:t>𝐵𝑃𝐹𝐼</m:t>
                     </m:r>
@@ -12751,7 +12884,7 @@
             </p:txBody>
           </p:sp>
         </mc:Choice>
-        <mc:Fallback>
+        <mc:Fallback xmlns="">
           <p:sp>
             <p:nvSpPr>
               <p:cNvPr id="18" name="TextBox 17">
@@ -12796,8 +12929,8 @@
           </p:sp>
         </mc:Fallback>
       </mc:AlternateContent>
-      <mc:AlternateContent xmlns:mc="http://schemas.openxmlformats.org/markup-compatibility/2006">
-        <mc:Choice xmlns:a14="http://schemas.microsoft.com/office/drawing/2010/main" Requires="a14">
+      <mc:AlternateContent xmlns:mc="http://schemas.openxmlformats.org/markup-compatibility/2006" xmlns:a14="http://schemas.microsoft.com/office/drawing/2010/main">
+        <mc:Choice Requires="a14">
           <p:sp>
             <p:nvSpPr>
               <p:cNvPr id="20" name="TextBox 19">
@@ -13034,7 +13167,7 @@
             </p:txBody>
           </p:sp>
         </mc:Choice>
-        <mc:Fallback>
+        <mc:Fallback xmlns="">
           <p:sp>
             <p:nvSpPr>
               <p:cNvPr id="20" name="TextBox 19">
@@ -13255,8 +13388,8 @@
           </a:p>
         </p:txBody>
       </p:sp>
-      <mc:AlternateContent xmlns:mc="http://schemas.openxmlformats.org/markup-compatibility/2006">
-        <mc:Choice xmlns:a14="http://schemas.microsoft.com/office/drawing/2010/main" Requires="a14">
+      <mc:AlternateContent xmlns:mc="http://schemas.openxmlformats.org/markup-compatibility/2006" xmlns:a14="http://schemas.microsoft.com/office/drawing/2010/main">
+        <mc:Choice Requires="a14">
           <p:sp>
             <p:nvSpPr>
               <p:cNvPr id="11" name="Content Placeholder 10">
@@ -13472,13 +13605,7 @@
                       <a:rPr lang="en-US" b="0" i="1" smtClean="0">
                         <a:latin typeface="Cambria Math" panose="02040503050406030204" pitchFamily="18" charset="0"/>
                       </a:rPr>
-                      <m:t>~[−10,</m:t>
-                    </m:r>
-                    <m:r>
-                      <a:rPr lang="en-US" b="0" i="1" smtClean="0">
-                        <a:latin typeface="Cambria Math" panose="02040503050406030204" pitchFamily="18" charset="0"/>
-                      </a:rPr>
-                      <m:t>10]</m:t>
+                      <m:t>~[−10,10]</m:t>
                     </m:r>
                   </m:oMath>
                 </a14:m>
@@ -13528,7 +13655,7 @@
             </p:txBody>
           </p:sp>
         </mc:Choice>
-        <mc:Fallback>
+        <mc:Fallback xmlns="">
           <p:sp>
             <p:nvSpPr>
               <p:cNvPr id="11" name="Content Placeholder 10">
@@ -13665,8 +13792,8 @@
           </a:p>
         </p:txBody>
       </p:sp>
-      <mc:AlternateContent xmlns:mc="http://schemas.openxmlformats.org/markup-compatibility/2006">
-        <mc:Choice xmlns:a14="http://schemas.microsoft.com/office/drawing/2010/main" Requires="a14">
+      <mc:AlternateContent xmlns:mc="http://schemas.openxmlformats.org/markup-compatibility/2006" xmlns:a14="http://schemas.microsoft.com/office/drawing/2010/main">
+        <mc:Choice Requires="a14">
           <p:sp>
             <p:nvSpPr>
               <p:cNvPr id="3" name="Content Placeholder 2">
@@ -14265,7 +14392,7 @@
             </p:txBody>
           </p:sp>
         </mc:Choice>
-        <mc:Fallback>
+        <mc:Fallback xmlns="">
           <p:sp>
             <p:nvSpPr>
               <p:cNvPr id="3" name="Content Placeholder 2">
@@ -14592,7 +14719,6 @@
             </a:bodyPr>
             <a:lstStyle/>
             <a:p>
-              <a:pPr/>
               <a:r>
                 <a:rPr lang="en-US" dirty="0"/>
                 <a:t>Spectral lines</a:t>
@@ -14698,7 +14824,6 @@
               </a:bodyPr>
               <a:lstStyle/>
               <a:p>
-                <a:pPr/>
                 <a:r>
                   <a:rPr lang="en-US" dirty="0"/>
                   <a:t>Spectral lines</a:t>
@@ -14706,8 +14831,8 @@
               </a:p>
             </p:txBody>
           </p:sp>
-          <mc:AlternateContent xmlns:mc="http://schemas.openxmlformats.org/markup-compatibility/2006">
-            <mc:Choice xmlns:a14="http://schemas.microsoft.com/office/drawing/2010/main" Requires="a14">
+          <mc:AlternateContent xmlns:mc="http://schemas.openxmlformats.org/markup-compatibility/2006" xmlns:a14="http://schemas.microsoft.com/office/drawing/2010/main">
+            <mc:Choice Requires="a14">
               <p:sp>
                 <p:nvSpPr>
                   <p:cNvPr id="9" name="TextBox 8">
@@ -14775,7 +14900,7 @@
                 </p:txBody>
               </p:sp>
             </mc:Choice>
-            <mc:Fallback>
+            <mc:Fallback xmlns="">
               <p:sp>
                 <p:nvSpPr>
                   <p:cNvPr id="9" name="TextBox 8">
@@ -14820,8 +14945,8 @@
               </p:sp>
             </mc:Fallback>
           </mc:AlternateContent>
-          <mc:AlternateContent xmlns:mc="http://schemas.openxmlformats.org/markup-compatibility/2006">
-            <mc:Choice xmlns:a14="http://schemas.microsoft.com/office/drawing/2010/main" Requires="a14">
+          <mc:AlternateContent xmlns:mc="http://schemas.openxmlformats.org/markup-compatibility/2006" xmlns:a14="http://schemas.microsoft.com/office/drawing/2010/main">
+            <mc:Choice Requires="a14">
               <p:sp>
                 <p:nvSpPr>
                   <p:cNvPr id="10" name="TextBox 9">
@@ -14889,7 +15014,7 @@
                 </p:txBody>
               </p:sp>
             </mc:Choice>
-            <mc:Fallback>
+            <mc:Fallback xmlns="">
               <p:sp>
                 <p:nvSpPr>
                   <p:cNvPr id="10" name="TextBox 9">

</xml_diff>

<commit_message>
Typo fixes, 1D Conv & Conclusions
</commit_message>
<xml_diff>
--- a/Classification_of_Harmonics_Using_ML_v1.pptx
+++ b/Classification_of_Harmonics_Using_ML_v1.pptx
@@ -238,7 +238,7 @@
           <a:p>
             <a:fld id="{B960BEAE-160E-4B13-AB9A-070617351B29}" type="datetimeFigureOut">
               <a:rPr lang="en-US" smtClean="0"/>
-              <a:t>12/1/2023</a:t>
+              <a:t>12/4/2023</a:t>
             </a:fld>
             <a:endParaRPr lang="en-US"/>
           </a:p>
@@ -374,7 +374,7 @@
           <a:p>
             <a:fld id="{AE9BE8EE-E1F0-4C54-B5FB-A1536BDFFAE1}" type="datetimeFigureOut">
               <a:rPr lang="en-US" smtClean="0"/>
-              <a:t>12/1/2023</a:t>
+              <a:t>12/4/2023</a:t>
             </a:fld>
             <a:endParaRPr lang="en-US"/>
           </a:p>
@@ -915,7 +915,7 @@
           <a:p>
             <a:fld id="{9BC8F13F-5072-BC4F-865C-EC3B1C2735E4}" type="datetime1">
               <a:rPr lang="en-US" smtClean="0"/>
-              <a:t>12/1/2023</a:t>
+              <a:t>12/4/2023</a:t>
             </a:fld>
             <a:endParaRPr lang="en-US"/>
           </a:p>
@@ -1669,7 +1669,7 @@
           <a:p>
             <a:fld id="{53E1DC51-1B7A-A944-9C6B-274EADB1BE41}" type="datetime1">
               <a:rPr lang="en-US" smtClean="0"/>
-              <a:t>12/1/2023</a:t>
+              <a:t>12/4/2023</a:t>
             </a:fld>
             <a:endParaRPr lang="en-US"/>
           </a:p>
@@ -2519,7 +2519,7 @@
           <a:p>
             <a:fld id="{E21B64A7-DE03-2046-B594-D8BA697AD366}" type="datetime1">
               <a:rPr lang="en-US" smtClean="0"/>
-              <a:t>12/1/2023</a:t>
+              <a:t>12/4/2023</a:t>
             </a:fld>
             <a:endParaRPr lang="en-US"/>
           </a:p>
@@ -3335,7 +3335,7 @@
           <a:p>
             <a:fld id="{CC68C66A-A5CF-6E4B-8D6E-304EE31F1223}" type="datetime1">
               <a:rPr lang="en-US" smtClean="0"/>
-              <a:t>12/1/2023</a:t>
+              <a:t>12/4/2023</a:t>
             </a:fld>
             <a:endParaRPr lang="en-US"/>
           </a:p>
@@ -3674,7 +3674,7 @@
           <a:p>
             <a:fld id="{CFA0F1A2-C743-DF4B-B1B2-43B12730EFA7}" type="datetime1">
               <a:rPr lang="en-US" smtClean="0"/>
-              <a:t>12/1/2023</a:t>
+              <a:t>12/4/2023</a:t>
             </a:fld>
             <a:endParaRPr lang="en-US"/>
           </a:p>
@@ -4176,7 +4176,7 @@
           <a:p>
             <a:fld id="{75505AE6-8D37-5E4C-9234-859DB2EA2EE6}" type="datetime1">
               <a:rPr lang="en-US" smtClean="0"/>
-              <a:t>12/1/2023</a:t>
+              <a:t>12/4/2023</a:t>
             </a:fld>
             <a:endParaRPr lang="en-US"/>
           </a:p>
@@ -4555,7 +4555,7 @@
           <a:p>
             <a:fld id="{07A70B6D-844E-EE4B-A506-F2AE312E2A16}" type="datetime1">
               <a:rPr lang="en-US" smtClean="0"/>
-              <a:t>12/1/2023</a:t>
+              <a:t>12/4/2023</a:t>
             </a:fld>
             <a:endParaRPr lang="en-US"/>
           </a:p>
@@ -5021,7 +5021,7 @@
           <a:p>
             <a:fld id="{0BFB5C49-0C71-CE43-99CD-7F7521E7BE36}" type="datetime1">
               <a:rPr lang="en-US" smtClean="0"/>
-              <a:t>12/1/2023</a:t>
+              <a:t>12/4/2023</a:t>
             </a:fld>
             <a:endParaRPr lang="en-US"/>
           </a:p>
@@ -5426,7 +5426,7 @@
           <a:p>
             <a:fld id="{23E39EE5-4D19-6944-992E-18BD3A79A541}" type="datetime1">
               <a:rPr lang="en-US" smtClean="0"/>
-              <a:t>12/1/2023</a:t>
+              <a:t>12/4/2023</a:t>
             </a:fld>
             <a:endParaRPr lang="en-US"/>
           </a:p>
@@ -5749,7 +5749,7 @@
           <a:p>
             <a:fld id="{63A1F1F1-8D82-0248-9B10-3900E9FFC9FA}" type="datetime1">
               <a:rPr lang="en-US" smtClean="0"/>
-              <a:t>12/1/2023</a:t>
+              <a:t>12/4/2023</a:t>
             </a:fld>
             <a:endParaRPr lang="en-US"/>
           </a:p>
@@ -6811,7 +6811,7 @@
               <a:pPr algn="ctr"/>
               <a:r>
                 <a:rPr lang="en-US" sz="1400" dirty="0"/>
-                <a:t>2DConv</a:t>
+                <a:t>1DConv</a:t>
               </a:r>
             </a:p>
           </p:txBody>
@@ -10352,20 +10352,8 @@
               </a:lnSpc>
             </a:pPr>
             <a:r>
-              <a:rPr lang="en-US"/>
-              <a:t>Successfully </a:t>
-            </a:r>
-            <a:r>
               <a:rPr lang="en-US" dirty="0"/>
-              <a:t>developed </a:t>
-            </a:r>
-            <a:r>
-              <a:rPr lang="en-US"/>
-              <a:t>two CNNs </a:t>
-            </a:r>
-            <a:r>
-              <a:rPr lang="en-US" dirty="0"/>
-              <a:t>for classification of signals with common variable dependent tones occurring at random harmonics</a:t>
+              <a:t>Successfully developed two CNNs for classification of signals with common variable dependent tones occurring at random harmonics</a:t>
             </a:r>
           </a:p>
           <a:p>
@@ -10453,7 +10441,7 @@
             </a:pPr>
             <a:r>
               <a:rPr lang="en-US" dirty="0"/>
-              <a:t>For example, probability of harmonics is not uniform and various significantly by mechanism</a:t>
+              <a:t>For example, probability of harmonics is not uniform and varies significantly by mechanism</a:t>
             </a:r>
           </a:p>
           <a:p>

</xml_diff>

<commit_message>
Presentation Update and deleting commented code for final submission
</commit_message>
<xml_diff>
--- a/Classification_of_Harmonics_Using_ML_v1.pptx
+++ b/Classification_of_Harmonics_Using_ML_v1.pptx
@@ -238,7 +238,7 @@
           <a:p>
             <a:fld id="{B960BEAE-160E-4B13-AB9A-070617351B29}" type="datetimeFigureOut">
               <a:rPr lang="en-US" smtClean="0"/>
-              <a:t>12/4/2023</a:t>
+              <a:t>12/9/2023</a:t>
             </a:fld>
             <a:endParaRPr lang="en-US"/>
           </a:p>
@@ -374,7 +374,7 @@
           <a:p>
             <a:fld id="{AE9BE8EE-E1F0-4C54-B5FB-A1536BDFFAE1}" type="datetimeFigureOut">
               <a:rPr lang="en-US" smtClean="0"/>
-              <a:t>12/4/2023</a:t>
+              <a:t>12/9/2023</a:t>
             </a:fld>
             <a:endParaRPr lang="en-US"/>
           </a:p>
@@ -769,6 +769,98 @@
           <a:bodyPr/>
           <a:lstStyle/>
           <a:p>
+            <a:r>
+              <a:rPr lang="en-US" dirty="0">
+                <a:solidFill>
+                  <a:srgbClr val="44546A"/>
+                </a:solidFill>
+              </a:rPr>
+              <a:t>(compare class 3 and 4) and 6</a:t>
+            </a:r>
+            <a:endParaRPr lang="en-US" dirty="0"/>
+          </a:p>
+        </p:txBody>
+      </p:sp>
+      <p:sp>
+        <p:nvSpPr>
+          <p:cNvPr id="4" name="Slide Number Placeholder 3"/>
+          <p:cNvSpPr>
+            <a:spLocks noGrp="1"/>
+          </p:cNvSpPr>
+          <p:nvPr>
+            <p:ph type="sldNum" sz="quarter" idx="5"/>
+          </p:nvPr>
+        </p:nvSpPr>
+        <p:spPr/>
+        <p:txBody>
+          <a:bodyPr/>
+          <a:lstStyle/>
+          <a:p>
+            <a:fld id="{4D98AFBF-E81A-4245-AE78-B5278836B43C}" type="slidenum">
+              <a:rPr lang="en-US" smtClean="0"/>
+              <a:t>16</a:t>
+            </a:fld>
+            <a:endParaRPr lang="en-US"/>
+          </a:p>
+        </p:txBody>
+      </p:sp>
+    </p:spTree>
+    <p:extLst>
+      <p:ext uri="{BB962C8B-B14F-4D97-AF65-F5344CB8AC3E}">
+        <p14:creationId xmlns:p14="http://schemas.microsoft.com/office/powerpoint/2010/main" val="686259035"/>
+      </p:ext>
+    </p:extLst>
+  </p:cSld>
+  <p:clrMapOvr>
+    <a:masterClrMapping/>
+  </p:clrMapOvr>
+</p:notes>
+</file>
+
+<file path=ppt/notesSlides/notesSlide3.xml><?xml version="1.0" encoding="utf-8"?>
+<p:notes xmlns:a="http://schemas.openxmlformats.org/drawingml/2006/main" xmlns:r="http://schemas.openxmlformats.org/officeDocument/2006/relationships" xmlns:p="http://schemas.openxmlformats.org/presentationml/2006/main">
+  <p:cSld>
+    <p:spTree>
+      <p:nvGrpSpPr>
+        <p:cNvPr id="1" name=""/>
+        <p:cNvGrpSpPr/>
+        <p:nvPr/>
+      </p:nvGrpSpPr>
+      <p:grpSpPr>
+        <a:xfrm>
+          <a:off x="0" y="0"/>
+          <a:ext cx="0" cy="0"/>
+          <a:chOff x="0" y="0"/>
+          <a:chExt cx="0" cy="0"/>
+        </a:xfrm>
+      </p:grpSpPr>
+      <p:sp>
+        <p:nvSpPr>
+          <p:cNvPr id="2" name="Slide Image Placeholder 1"/>
+          <p:cNvSpPr>
+            <a:spLocks noGrp="1" noRot="1" noChangeAspect="1"/>
+          </p:cNvSpPr>
+          <p:nvPr>
+            <p:ph type="sldImg"/>
+          </p:nvPr>
+        </p:nvSpPr>
+        <p:spPr/>
+      </p:sp>
+      <p:sp>
+        <p:nvSpPr>
+          <p:cNvPr id="3" name="Notes Placeholder 2"/>
+          <p:cNvSpPr>
+            <a:spLocks noGrp="1"/>
+          </p:cNvSpPr>
+          <p:nvPr>
+            <p:ph type="body" idx="1"/>
+          </p:nvPr>
+        </p:nvSpPr>
+        <p:spPr/>
+        <p:txBody>
+          <a:bodyPr/>
+          <a:lstStyle/>
+          <a:p>
             <a:endParaRPr lang="en-US" dirty="0"/>
           </a:p>
         </p:txBody>
@@ -915,7 +1007,7 @@
           <a:p>
             <a:fld id="{9BC8F13F-5072-BC4F-865C-EC3B1C2735E4}" type="datetime1">
               <a:rPr lang="en-US" smtClean="0"/>
-              <a:t>12/4/2023</a:t>
+              <a:t>12/9/2023</a:t>
             </a:fld>
             <a:endParaRPr lang="en-US"/>
           </a:p>
@@ -1669,7 +1761,7 @@
           <a:p>
             <a:fld id="{53E1DC51-1B7A-A944-9C6B-274EADB1BE41}" type="datetime1">
               <a:rPr lang="en-US" smtClean="0"/>
-              <a:t>12/4/2023</a:t>
+              <a:t>12/9/2023</a:t>
             </a:fld>
             <a:endParaRPr lang="en-US"/>
           </a:p>
@@ -2519,7 +2611,7 @@
           <a:p>
             <a:fld id="{E21B64A7-DE03-2046-B594-D8BA697AD366}" type="datetime1">
               <a:rPr lang="en-US" smtClean="0"/>
-              <a:t>12/4/2023</a:t>
+              <a:t>12/9/2023</a:t>
             </a:fld>
             <a:endParaRPr lang="en-US"/>
           </a:p>
@@ -3335,7 +3427,7 @@
           <a:p>
             <a:fld id="{CC68C66A-A5CF-6E4B-8D6E-304EE31F1223}" type="datetime1">
               <a:rPr lang="en-US" smtClean="0"/>
-              <a:t>12/4/2023</a:t>
+              <a:t>12/9/2023</a:t>
             </a:fld>
             <a:endParaRPr lang="en-US"/>
           </a:p>
@@ -3674,7 +3766,7 @@
           <a:p>
             <a:fld id="{CFA0F1A2-C743-DF4B-B1B2-43B12730EFA7}" type="datetime1">
               <a:rPr lang="en-US" smtClean="0"/>
-              <a:t>12/4/2023</a:t>
+              <a:t>12/9/2023</a:t>
             </a:fld>
             <a:endParaRPr lang="en-US"/>
           </a:p>
@@ -4176,7 +4268,7 @@
           <a:p>
             <a:fld id="{75505AE6-8D37-5E4C-9234-859DB2EA2EE6}" type="datetime1">
               <a:rPr lang="en-US" smtClean="0"/>
-              <a:t>12/4/2023</a:t>
+              <a:t>12/9/2023</a:t>
             </a:fld>
             <a:endParaRPr lang="en-US"/>
           </a:p>
@@ -4555,7 +4647,7 @@
           <a:p>
             <a:fld id="{07A70B6D-844E-EE4B-A506-F2AE312E2A16}" type="datetime1">
               <a:rPr lang="en-US" smtClean="0"/>
-              <a:t>12/4/2023</a:t>
+              <a:t>12/9/2023</a:t>
             </a:fld>
             <a:endParaRPr lang="en-US"/>
           </a:p>
@@ -5021,7 +5113,7 @@
           <a:p>
             <a:fld id="{0BFB5C49-0C71-CE43-99CD-7F7521E7BE36}" type="datetime1">
               <a:rPr lang="en-US" smtClean="0"/>
-              <a:t>12/4/2023</a:t>
+              <a:t>12/9/2023</a:t>
             </a:fld>
             <a:endParaRPr lang="en-US"/>
           </a:p>
@@ -5426,7 +5518,7 @@
           <a:p>
             <a:fld id="{23E39EE5-4D19-6944-992E-18BD3A79A541}" type="datetime1">
               <a:rPr lang="en-US" smtClean="0"/>
-              <a:t>12/4/2023</a:t>
+              <a:t>12/9/2023</a:t>
             </a:fld>
             <a:endParaRPr lang="en-US"/>
           </a:p>
@@ -5749,7 +5841,7 @@
           <a:p>
             <a:fld id="{63A1F1F1-8D82-0248-9B10-3900E9FFC9FA}" type="datetime1">
               <a:rPr lang="en-US" smtClean="0"/>
-              <a:t>12/4/2023</a:t>
+              <a:t>12/9/2023</a:t>
             </a:fld>
             <a:endParaRPr lang="en-US"/>
           </a:p>
@@ -6553,7 +6645,7 @@
             <a:pPr lvl="1"/>
             <a:r>
               <a:rPr lang="en-US" dirty="0"/>
-              <a:t>Filter size: [8 x 8]</a:t>
+              <a:t>Filter size: [1 x 8]</a:t>
             </a:r>
           </a:p>
           <a:p>
@@ -8054,6 +8146,7 @@
             <a:off x="1343026" y="320040"/>
             <a:ext cx="8006348" cy="820271"/>
           </a:xfrm>
+          <a:noFill/>
         </p:spPr>
         <p:txBody>
           <a:bodyPr>
@@ -8089,6 +8182,7 @@
             <a:off x="1271333" y="1383825"/>
             <a:ext cx="8078040" cy="4793138"/>
           </a:xfrm>
+          <a:noFill/>
         </p:spPr>
         <p:txBody>
           <a:bodyPr>
@@ -9482,7 +9576,7 @@
             <a:pPr algn="ctr"/>
             <a:r>
               <a:rPr lang="en-US" dirty="0"/>
-              <a:t>Conv1D Results</a:t>
+              <a:t>1D CNN Results</a:t>
             </a:r>
           </a:p>
         </p:txBody>
@@ -9517,7 +9611,7 @@
             <a:pPr algn="ctr"/>
             <a:r>
               <a:rPr lang="en-US" dirty="0"/>
-              <a:t>Conv2D Results</a:t>
+              <a:t>2D CNN Results</a:t>
             </a:r>
           </a:p>
         </p:txBody>
@@ -9582,7 +9676,7 @@
         </p:nvSpPr>
         <p:spPr>
           <a:xfrm>
-            <a:off x="439209" y="750091"/>
+            <a:off x="439209" y="755171"/>
             <a:ext cx="5656792" cy="1477328"/>
           </a:xfrm>
           <a:prstGeom prst="rect">
@@ -9606,7 +9700,7 @@
                   <a:schemeClr val="tx2"/>
                 </a:solidFill>
               </a:rPr>
-              <a:t>Cross Validation Accuracy</a:t>
+              <a:t>Cross Validation (5 folds)</a:t>
             </a:r>
           </a:p>
           <a:p>
@@ -9620,7 +9714,7 @@
                   <a:schemeClr val="tx2"/>
                 </a:solidFill>
               </a:rPr>
-              <a:t>5 folds</a:t>
+              <a:t>Accuracy: 95.15%</a:t>
             </a:r>
           </a:p>
           <a:p>
@@ -9634,7 +9728,7 @@
                   <a:schemeClr val="tx2"/>
                 </a:solidFill>
               </a:rPr>
-              <a:t>95.15% with standard deviation of 0.22%</a:t>
+              <a:t>Standard deviation: 0.22%</a:t>
             </a:r>
           </a:p>
           <a:p>
@@ -9691,7 +9785,7 @@
                   <a:schemeClr val="tx2"/>
                 </a:solidFill>
               </a:rPr>
-              <a:t>Cross Validation Accuracy</a:t>
+              <a:t>Cross Validation (5 folds)</a:t>
             </a:r>
           </a:p>
           <a:p>
@@ -9705,7 +9799,7 @@
                   <a:schemeClr val="tx2"/>
                 </a:solidFill>
               </a:rPr>
-              <a:t>5 folds</a:t>
+              <a:t>Accuracy: 97.51%</a:t>
             </a:r>
           </a:p>
           <a:p>
@@ -9719,7 +9813,7 @@
                   <a:schemeClr val="tx2"/>
                 </a:solidFill>
               </a:rPr>
-              <a:t>97.51% with standard deviation of 0.24%</a:t>
+              <a:t>Standard deviation: 0.24%</a:t>
             </a:r>
           </a:p>
           <a:p>
@@ -9733,7 +9827,7 @@
                   <a:schemeClr val="tx2"/>
                 </a:solidFill>
               </a:rPr>
-              <a:t>Consistent accuracy across all SNR</a:t>
+              <a:t>Consistent accuracy across all peak SNR</a:t>
             </a:r>
           </a:p>
           <a:p>
@@ -9771,7 +9865,7 @@
         </p:blipFill>
         <p:spPr>
           <a:xfrm>
-            <a:off x="352333" y="2188347"/>
+            <a:off x="352333" y="2193427"/>
             <a:ext cx="5364480" cy="4023360"/>
           </a:xfrm>
           <a:prstGeom prst="rect">
@@ -9868,7 +9962,7 @@
             <a:pPr algn="ctr"/>
             <a:r>
               <a:rPr lang="en-US" dirty="0"/>
-              <a:t>Conv1D Results</a:t>
+              <a:t>1D CNN Results</a:t>
             </a:r>
           </a:p>
         </p:txBody>
@@ -9902,7 +9996,7 @@
             <a:pPr algn="ctr"/>
             <a:r>
               <a:rPr lang="en-US" dirty="0"/>
-              <a:t>Conv2D Results</a:t>
+              <a:t>2D CNN Results</a:t>
             </a:r>
           </a:p>
         </p:txBody>
@@ -9991,7 +10085,7 @@
                   <a:schemeClr val="tx2"/>
                 </a:solidFill>
               </a:rPr>
-              <a:t>Both networks have acceptable results, however Conv2D Network has lower error rates overall</a:t>
+              <a:t>Both networks have acceptable results, however 2D CNN has lower error rates overall</a:t>
             </a:r>
           </a:p>
           <a:p>
@@ -10005,7 +10099,7 @@
                   <a:schemeClr val="tx2"/>
                 </a:solidFill>
               </a:rPr>
-              <a:t>Conv2D network has significantly higher accuracy for classes 3 through 8</a:t>
+              <a:t>2D CNN has significantly higher accuracy for classes 3 through 8</a:t>
             </a:r>
           </a:p>
           <a:p>
@@ -10062,10 +10156,10 @@
             <a:r>
               <a:rPr lang="en-US" dirty="0">
                 <a:solidFill>
-                  <a:srgbClr val="44546A"/>
+                  <a:schemeClr val="tx2"/>
                 </a:solidFill>
               </a:rPr>
-              <a:t>(compare class 3 and 4)</a:t>
+              <a:t>for 2D CNN results</a:t>
             </a:r>
           </a:p>
         </p:txBody>
@@ -10087,7 +10181,7 @@
           </p:nvPr>
         </p:nvPicPr>
         <p:blipFill>
-          <a:blip r:embed="rId2"/>
+          <a:blip r:embed="rId3"/>
           <a:stretch>
             <a:fillRect/>
           </a:stretch>
@@ -10118,7 +10212,7 @@
           <p:nvPr/>
         </p:nvPicPr>
         <p:blipFill>
-          <a:blip r:embed="rId3"/>
+          <a:blip r:embed="rId4"/>
           <a:stretch>
             <a:fillRect/>
           </a:stretch>
@@ -10202,7 +10296,7 @@
           <p:nvPr/>
         </p:nvPicPr>
         <p:blipFill>
-          <a:blip r:embed="rId4"/>
+          <a:blip r:embed="rId5"/>
           <a:stretch>
             <a:fillRect/>
           </a:stretch>
@@ -10232,7 +10326,7 @@
           <p:nvPr/>
         </p:nvPicPr>
         <p:blipFill>
-          <a:blip r:embed="rId4"/>
+          <a:blip r:embed="rId5"/>
           <a:stretch>
             <a:fillRect/>
           </a:stretch>
@@ -11001,7 +11095,7 @@
           <a:p>
             <a:r>
               <a:rPr lang="en-US" dirty="0"/>
-              <a:t>The goal of this project is to develop a machine learning (ML) algorithm to classify signals with common variable dependent tones occurring at random harmonics</a:t>
+              <a:t>The goal of this project is to develop a machine learning (ML) algorithm to classify signals with common variable dependent tones </a:t>
             </a:r>
           </a:p>
           <a:p>
@@ -11014,6 +11108,46 @@
           <a:p>
             <a:r>
               <a:rPr lang="en-US" dirty="0"/>
+              <a:t>The presence of large numbers of overlapping tones makes classification of source mechanisms difficult</a:t>
+            </a:r>
+          </a:p>
+          <a:p>
+            <a:pPr lvl="1"/>
+            <a:r>
+              <a:rPr lang="en-US" dirty="0"/>
+              <a:t>Typically requires an experienced analyst and can not always be performed simultaneously with data collection</a:t>
+            </a:r>
+          </a:p>
+          <a:p>
+            <a:r>
+              <a:rPr lang="en-US" dirty="0"/>
+              <a:t>Examples of datasets with common variable dependent tones and harmonics include:</a:t>
+            </a:r>
+          </a:p>
+          <a:p>
+            <a:pPr lvl="1"/>
+            <a:r>
+              <a:rPr lang="en-US" dirty="0"/>
+              <a:t>Strucutureborne vibration data from rotating machinery</a:t>
+            </a:r>
+          </a:p>
+          <a:p>
+            <a:pPr lvl="1"/>
+            <a:r>
+              <a:rPr lang="en-US" dirty="0"/>
+              <a:t>Airborne noise data from drones</a:t>
+            </a:r>
+          </a:p>
+          <a:p>
+            <a:pPr lvl="1"/>
+            <a:r>
+              <a:rPr lang="en-US" dirty="0"/>
+              <a:t>Underwater acoustic data from ships or mammals</a:t>
+            </a:r>
+          </a:p>
+          <a:p>
+            <a:r>
+              <a:rPr lang="en-US" dirty="0"/>
               <a:t>The use of machine learning algorithms to classify frequency spectra has been a significant area of study</a:t>
             </a:r>
           </a:p>
@@ -11045,46 +11179,6 @@
             <a:r>
               <a:rPr lang="en-US" dirty="0"/>
               <a:t> 2019)</a:t>
-            </a:r>
-          </a:p>
-          <a:p>
-            <a:r>
-              <a:rPr lang="en-US" dirty="0"/>
-              <a:t>The presence of large numbers of overlapping tones makes classification of source mechanisms difficult</a:t>
-            </a:r>
-          </a:p>
-          <a:p>
-            <a:pPr lvl="1"/>
-            <a:r>
-              <a:rPr lang="en-US" dirty="0"/>
-              <a:t>Typically requires an experienced analyst and can not always be performed simultaneously with data collection</a:t>
-            </a:r>
-          </a:p>
-          <a:p>
-            <a:r>
-              <a:rPr lang="en-US" dirty="0"/>
-              <a:t>Examples of datasets with common variable dependent tones and harmonics include:</a:t>
-            </a:r>
-          </a:p>
-          <a:p>
-            <a:pPr lvl="1"/>
-            <a:r>
-              <a:rPr lang="en-US" dirty="0"/>
-              <a:t>Strucutureborne vibration data from rotating machinery</a:t>
-            </a:r>
-          </a:p>
-          <a:p>
-            <a:pPr lvl="1"/>
-            <a:r>
-              <a:rPr lang="en-US" dirty="0"/>
-              <a:t>Airborne noise data from drones</a:t>
-            </a:r>
-          </a:p>
-          <a:p>
-            <a:pPr lvl="1"/>
-            <a:r>
-              <a:rPr lang="en-US" dirty="0"/>
-              <a:t>Underwater acoustic data from ships or mammals</a:t>
             </a:r>
           </a:p>
           <a:p>
@@ -13355,8 +13449,8 @@
           </a:p>
         </p:txBody>
       </p:sp>
-      <mc:AlternateContent xmlns:mc="http://schemas.openxmlformats.org/markup-compatibility/2006" xmlns:a14="http://schemas.microsoft.com/office/drawing/2010/main">
-        <mc:Choice Requires="a14">
+      <mc:AlternateContent xmlns:mc="http://schemas.openxmlformats.org/markup-compatibility/2006">
+        <mc:Choice xmlns:a14="http://schemas.microsoft.com/office/drawing/2010/main" Requires="a14">
           <p:sp>
             <p:nvSpPr>
               <p:cNvPr id="11" name="Content Placeholder 10">
@@ -13430,70 +13524,18 @@
                       </a:schemeClr>
                     </a:solidFill>
                   </a:rPr>
-                  <a:t>For each data sample</a:t>
+                  <a:t>For each </a:t>
+                </a:r>
+                <a:r>
+                  <a:rPr lang="en-US" dirty="0"/>
+                  <a:t>source (7 sources + no source case)</a:t>
                 </a:r>
               </a:p>
               <a:p>
                 <a:pPr lvl="1"/>
                 <a:r>
                   <a:rPr lang="en-US" dirty="0"/>
-                  <a:t>Source frequencies present determined by random sampling </a:t>
-                </a:r>
-                <a14:m>
-                  <m:oMath xmlns:m="http://schemas.openxmlformats.org/officeDocument/2006/math">
-                    <m:r>
-                      <a:rPr lang="en-US" b="0" i="1" smtClean="0">
-                        <a:latin typeface="Cambria Math" panose="02040503050406030204" pitchFamily="18" charset="0"/>
-                      </a:rPr>
-                      <m:t>𝑈</m:t>
-                    </m:r>
-                    <m:r>
-                      <a:rPr lang="en-US" b="0" i="1" smtClean="0">
-                        <a:latin typeface="Cambria Math" panose="02040503050406030204" pitchFamily="18" charset="0"/>
-                      </a:rPr>
-                      <m:t>~[1,8]</m:t>
-                    </m:r>
-                  </m:oMath>
-                </a14:m>
-                <a:r>
-                  <a:rPr lang="en-US" i="1" dirty="0">
-                    <a:solidFill>
-                      <a:schemeClr val="tx2">
-                        <a:alpha val="77000"/>
-                      </a:schemeClr>
-                    </a:solidFill>
-                  </a:rPr>
-                  <a:t> </a:t>
-                </a:r>
-                <a:r>
-                  <a:rPr lang="en-US" dirty="0">
-                    <a:solidFill>
-                      <a:schemeClr val="tx2">
-                        <a:alpha val="77000"/>
-                      </a:schemeClr>
-                    </a:solidFill>
-                  </a:rPr>
-                  <a:t>distribution without replacement</a:t>
-                </a:r>
-              </a:p>
-              <a:p>
-                <a:pPr lvl="2"/>
-                <a:r>
-                  <a:rPr lang="en-US" dirty="0">
-                    <a:solidFill>
-                      <a:schemeClr val="tx2">
-                        <a:alpha val="77000"/>
-                      </a:schemeClr>
-                    </a:solidFill>
-                  </a:rPr>
-                  <a:t>7 sources + no source case</a:t>
-                </a:r>
-              </a:p>
-              <a:p>
-                <a:pPr lvl="1"/>
-                <a:r>
-                  <a:rPr lang="en-US" dirty="0"/>
-                  <a:t>Harmonics present determined by random sampling</a:t>
+                  <a:t>Determine number of harmonics present by random sampling</a:t>
                 </a:r>
                 <a:r>
                   <a:rPr lang="en-US" b="0" dirty="0"/>
@@ -13533,11 +13575,14 @@
                       </a:schemeClr>
                     </a:solidFill>
                   </a:rPr>
-                  <a:t>distribution with replacement for each </a:t>
+                  <a:t>distribution</a:t>
                 </a:r>
+              </a:p>
+              <a:p>
+                <a:pPr lvl="2"/>
                 <a:r>
                   <a:rPr lang="en-US" dirty="0"/>
-                  <a:t>source (shaft rate, electrical line frequency, …) </a:t>
+                  <a:t>e</a:t>
                 </a:r>
                 <a:r>
                   <a:rPr lang="en-US" dirty="0">
@@ -13547,7 +13592,77 @@
                       </a:schemeClr>
                     </a:solidFill>
                   </a:rPr>
-                  <a:t>present from previous step</a:t>
+                  <a:t>.g. 4</a:t>
+                </a:r>
+              </a:p>
+              <a:p>
+                <a:pPr lvl="1"/>
+                <a:r>
+                  <a:rPr lang="en-US" dirty="0"/>
+                  <a:t>Determine order of harmonics present by sampling</a:t>
+                </a:r>
+                <a:r>
+                  <a:rPr lang="en-US" dirty="0">
+                    <a:solidFill>
+                      <a:schemeClr val="tx2">
+                        <a:alpha val="77000"/>
+                      </a:schemeClr>
+                    </a:solidFill>
+                  </a:rPr>
+                  <a:t> without replacement a </a:t>
+                </a:r>
+                <a14:m>
+                  <m:oMath xmlns:m="http://schemas.openxmlformats.org/officeDocument/2006/math">
+                    <m:r>
+                      <a:rPr lang="en-US" b="0" i="1" smtClean="0">
+                        <a:latin typeface="Cambria Math" panose="02040503050406030204" pitchFamily="18" charset="0"/>
+                      </a:rPr>
+                      <m:t>𝑈</m:t>
+                    </m:r>
+                    <m:r>
+                      <a:rPr lang="en-US" b="0" i="1" smtClean="0">
+                        <a:latin typeface="Cambria Math" panose="02040503050406030204" pitchFamily="18" charset="0"/>
+                      </a:rPr>
+                      <m:t>~[1,10]</m:t>
+                    </m:r>
+                  </m:oMath>
+                </a14:m>
+                <a:r>
+                  <a:rPr lang="en-US" i="1" dirty="0">
+                    <a:solidFill>
+                      <a:schemeClr val="tx2">
+                        <a:alpha val="77000"/>
+                      </a:schemeClr>
+                    </a:solidFill>
+                  </a:rPr>
+                  <a:t> </a:t>
+                </a:r>
+                <a:r>
+                  <a:rPr lang="en-US" dirty="0">
+                    <a:solidFill>
+                      <a:schemeClr val="tx2">
+                        <a:alpha val="77000"/>
+                      </a:schemeClr>
+                    </a:solidFill>
+                  </a:rPr>
+                  <a:t>distribution for the total number of harmonics present</a:t>
+                </a:r>
+              </a:p>
+              <a:p>
+                <a:pPr lvl="2"/>
+                <a:r>
+                  <a:rPr lang="en-US" dirty="0"/>
+                  <a:t>e</a:t>
+                </a:r>
+                <a:r>
+                  <a:rPr lang="en-US" dirty="0">
+                    <a:solidFill>
+                      <a:schemeClr val="tx2">
+                        <a:alpha val="77000"/>
+                      </a:schemeClr>
+                    </a:solidFill>
+                  </a:rPr>
+                  <a:t>.g. [1, 8, 4, 3]</a:t>
                 </a:r>
               </a:p>
               <a:p>
@@ -13598,6 +13713,19 @@
                 </a:r>
               </a:p>
               <a:p>
+                <a:pPr lvl="2"/>
+                <a:r>
+                  <a:rPr lang="en-US" dirty="0">
+                    <a:solidFill>
+                      <a:schemeClr val="tx2">
+                        <a:alpha val="77000"/>
+                      </a:schemeClr>
+                    </a:solidFill>
+                  </a:rPr>
+                  <a:t>e.g. [-10, 0, 6, 2]</a:t>
+                </a:r>
+              </a:p>
+              <a:p>
                 <a:pPr lvl="1"/>
                 <a:r>
                   <a:rPr lang="en-US" dirty="0">
@@ -13622,7 +13750,7 @@
             </p:txBody>
           </p:sp>
         </mc:Choice>
-        <mc:Fallback xmlns="">
+        <mc:Fallback>
           <p:sp>
             <p:nvSpPr>
               <p:cNvPr id="11" name="Content Placeholder 10">
@@ -13647,7 +13775,7 @@
               <a:blipFill>
                 <a:blip r:embed="rId2"/>
                 <a:stretch>
-                  <a:fillRect l="-1623" t="-2421"/>
+                  <a:fillRect l="-1623" t="-2421" b="-121"/>
                 </a:stretch>
               </a:blipFill>
             </p:spPr>
@@ -13759,8 +13887,8 @@
           </a:p>
         </p:txBody>
       </p:sp>
-      <mc:AlternateContent xmlns:mc="http://schemas.openxmlformats.org/markup-compatibility/2006" xmlns:a14="http://schemas.microsoft.com/office/drawing/2010/main">
-        <mc:Choice Requires="a14">
+      <mc:AlternateContent xmlns:mc="http://schemas.openxmlformats.org/markup-compatibility/2006">
+        <mc:Choice xmlns:a14="http://schemas.microsoft.com/office/drawing/2010/main" Requires="a14">
           <p:sp>
             <p:nvSpPr>
               <p:cNvPr id="3" name="Content Placeholder 2">
@@ -13782,6 +13910,179 @@
               <a:bodyPr/>
               <a:lstStyle/>
               <a:p>
+                <a14:m>
+                  <m:oMath xmlns:m="http://schemas.openxmlformats.org/officeDocument/2006/math">
+                    <m:sSub>
+                      <m:sSubPr>
+                        <m:ctrlPr>
+                          <a:rPr lang="en-US" i="1" smtClean="0">
+                            <a:latin typeface="Cambria Math" panose="02040503050406030204" pitchFamily="18" charset="0"/>
+                          </a:rPr>
+                        </m:ctrlPr>
+                      </m:sSubPr>
+                      <m:e>
+                        <m:r>
+                          <a:rPr lang="en-US">
+                            <a:latin typeface="Cambria Math" panose="02040503050406030204" pitchFamily="18" charset="0"/>
+                          </a:rPr>
+                          <m:t>𝐱</m:t>
+                        </m:r>
+                      </m:e>
+                      <m:sub>
+                        <m:r>
+                          <a:rPr lang="en-US">
+                            <a:latin typeface="Cambria Math" panose="02040503050406030204" pitchFamily="18" charset="0"/>
+                          </a:rPr>
+                          <m:t>𝑖</m:t>
+                        </m:r>
+                      </m:sub>
+                    </m:sSub>
+                    <m:r>
+                      <a:rPr lang="en-US">
+                        <a:latin typeface="Cambria Math" panose="02040503050406030204" pitchFamily="18" charset="0"/>
+                      </a:rPr>
+                      <m:t>=</m:t>
+                    </m:r>
+                    <m:nary>
+                      <m:naryPr>
+                        <m:chr m:val="∑"/>
+                        <m:ctrlPr>
+                          <a:rPr lang="en-US" i="1">
+                            <a:latin typeface="Cambria Math" panose="02040503050406030204" pitchFamily="18" charset="0"/>
+                          </a:rPr>
+                        </m:ctrlPr>
+                      </m:naryPr>
+                      <m:sub>
+                        <m:r>
+                          <m:rPr>
+                            <m:brk m:alnAt="23"/>
+                          </m:rPr>
+                          <a:rPr lang="en-US" i="1">
+                            <a:latin typeface="Cambria Math" panose="02040503050406030204" pitchFamily="18" charset="0"/>
+                          </a:rPr>
+                          <m:t>𝑛</m:t>
+                        </m:r>
+                        <m:r>
+                          <m:rPr>
+                            <m:brk m:alnAt="23"/>
+                          </m:rPr>
+                          <a:rPr lang="en-US">
+                            <a:latin typeface="Cambria Math" panose="02040503050406030204" pitchFamily="18" charset="0"/>
+                          </a:rPr>
+                          <m:t>=</m:t>
+                        </m:r>
+                        <m:r>
+                          <a:rPr lang="en-US">
+                            <a:latin typeface="Cambria Math" panose="02040503050406030204" pitchFamily="18" charset="0"/>
+                          </a:rPr>
+                          <m:t>1</m:t>
+                        </m:r>
+                      </m:sub>
+                      <m:sup>
+                        <m:r>
+                          <a:rPr lang="en-US" i="1">
+                            <a:latin typeface="Cambria Math" panose="02040503050406030204" pitchFamily="18" charset="0"/>
+                          </a:rPr>
+                          <m:t>𝑁</m:t>
+                        </m:r>
+                      </m:sup>
+                      <m:e>
+                        <m:sSub>
+                          <m:sSubPr>
+                            <m:ctrlPr>
+                              <a:rPr lang="en-US" i="1">
+                                <a:latin typeface="Cambria Math" panose="02040503050406030204" pitchFamily="18" charset="0"/>
+                              </a:rPr>
+                            </m:ctrlPr>
+                          </m:sSubPr>
+                          <m:e>
+                            <m:r>
+                              <a:rPr lang="en-US">
+                                <a:latin typeface="Cambria Math" panose="02040503050406030204" pitchFamily="18" charset="0"/>
+                              </a:rPr>
+                              <m:t>𝐬</m:t>
+                            </m:r>
+                          </m:e>
+                          <m:sub>
+                            <m:r>
+                              <a:rPr lang="en-US">
+                                <a:latin typeface="Cambria Math" panose="02040503050406030204" pitchFamily="18" charset="0"/>
+                              </a:rPr>
+                              <m:t>𝑖</m:t>
+                            </m:r>
+                            <m:r>
+                              <a:rPr lang="en-US">
+                                <a:latin typeface="Cambria Math" panose="02040503050406030204" pitchFamily="18" charset="0"/>
+                              </a:rPr>
+                              <m:t>,</m:t>
+                            </m:r>
+                            <m:r>
+                              <a:rPr lang="en-US" i="1">
+                                <a:latin typeface="Cambria Math" panose="02040503050406030204" pitchFamily="18" charset="0"/>
+                              </a:rPr>
+                              <m:t>𝑘</m:t>
+                            </m:r>
+                            <m:r>
+                              <a:rPr lang="en-US">
+                                <a:latin typeface="Cambria Math" panose="02040503050406030204" pitchFamily="18" charset="0"/>
+                              </a:rPr>
+                              <m:t>,</m:t>
+                            </m:r>
+                            <m:r>
+                              <a:rPr lang="en-US" i="1">
+                                <a:latin typeface="Cambria Math" panose="02040503050406030204" pitchFamily="18" charset="0"/>
+                              </a:rPr>
+                              <m:t>𝑛</m:t>
+                            </m:r>
+                          </m:sub>
+                        </m:sSub>
+                      </m:e>
+                    </m:nary>
+                    <m:r>
+                      <a:rPr lang="en-US" i="1">
+                        <a:latin typeface="Cambria Math" panose="02040503050406030204" pitchFamily="18" charset="0"/>
+                      </a:rPr>
+                      <m:t>+</m:t>
+                    </m:r>
+                    <m:sSub>
+                      <m:sSubPr>
+                        <m:ctrlPr>
+                          <a:rPr lang="en-US" i="1">
+                            <a:latin typeface="Cambria Math" panose="02040503050406030204" pitchFamily="18" charset="0"/>
+                          </a:rPr>
+                        </m:ctrlPr>
+                      </m:sSubPr>
+                      <m:e>
+                        <m:r>
+                          <a:rPr lang="en-US" b="1">
+                            <a:latin typeface="Cambria Math" panose="02040503050406030204" pitchFamily="18" charset="0"/>
+                          </a:rPr>
+                          <m:t>𝐧</m:t>
+                        </m:r>
+                      </m:e>
+                      <m:sub>
+                        <m:r>
+                          <a:rPr lang="en-US" i="1">
+                            <a:latin typeface="Cambria Math" panose="02040503050406030204" pitchFamily="18" charset="0"/>
+                          </a:rPr>
+                          <m:t>𝑖</m:t>
+                        </m:r>
+                      </m:sub>
+                    </m:sSub>
+                    <m:r>
+                      <a:rPr lang="en-US" i="1">
+                        <a:latin typeface="Cambria Math" panose="02040503050406030204" pitchFamily="18" charset="0"/>
+                      </a:rPr>
+                      <m:t> </m:t>
+                    </m:r>
+                  </m:oMath>
+                </a14:m>
+                <a:endParaRPr lang="en-US" i="1" dirty="0">
+                  <a:latin typeface="Cambria Math" panose="02040503050406030204" pitchFamily="18" charset="0"/>
+                </a:endParaRPr>
+              </a:p>
+              <a:p>
+                <a:pPr lvl="1"/>
                 <a14:m>
                   <m:oMath xmlns:m="http://schemas.openxmlformats.org/officeDocument/2006/math">
                     <m:r>
@@ -13809,33 +14110,7 @@
                 </a:r>
               </a:p>
               <a:p>
-                <a14:m>
-                  <m:oMath xmlns:m="http://schemas.openxmlformats.org/officeDocument/2006/math">
-                    <m:r>
-                      <a:rPr lang="en-US" b="0" i="1" smtClean="0">
-                        <a:solidFill>
-                          <a:schemeClr val="tx2">
-                            <a:alpha val="77000"/>
-                          </a:schemeClr>
-                        </a:solidFill>
-                        <a:latin typeface="Cambria Math" panose="02040503050406030204" pitchFamily="18" charset="0"/>
-                      </a:rPr>
-                      <m:t>𝑘</m:t>
-                    </m:r>
-                  </m:oMath>
-                </a14:m>
-                <a:r>
-                  <a:rPr lang="en-US" dirty="0">
-                    <a:solidFill>
-                      <a:schemeClr val="tx2">
-                        <a:alpha val="77000"/>
-                      </a:schemeClr>
-                    </a:solidFill>
-                  </a:rPr>
-                  <a:t> denotes source</a:t>
-                </a:r>
-              </a:p>
-              <a:p>
+                <a:pPr lvl="1"/>
                 <a14:m>
                   <m:oMath xmlns:m="http://schemas.openxmlformats.org/officeDocument/2006/math">
                     <m:r>
@@ -13863,6 +14138,7 @@
                 </a:r>
               </a:p>
               <a:p>
+                <a:pPr lvl="1"/>
                 <a14:m>
                   <m:oMath xmlns:m="http://schemas.openxmlformats.org/officeDocument/2006/math">
                     <m:sSub>
@@ -14016,298 +14292,6 @@
                 </a:endParaRPr>
               </a:p>
               <a:p>
-                <a14:m>
-                  <m:oMath xmlns:m="http://schemas.openxmlformats.org/officeDocument/2006/math">
-                    <m:sSub>
-                      <m:sSubPr>
-                        <m:ctrlPr>
-                          <a:rPr lang="en-US" i="1" smtClean="0">
-                            <a:solidFill>
-                              <a:schemeClr val="tx2">
-                                <a:alpha val="77000"/>
-                              </a:schemeClr>
-                            </a:solidFill>
-                            <a:latin typeface="Cambria Math" panose="02040503050406030204" pitchFamily="18" charset="0"/>
-                          </a:rPr>
-                        </m:ctrlPr>
-                      </m:sSubPr>
-                      <m:e>
-                        <m:r>
-                          <a:rPr lang="en-US" smtClean="0">
-                            <a:solidFill>
-                              <a:schemeClr val="tx2">
-                                <a:alpha val="77000"/>
-                              </a:schemeClr>
-                            </a:solidFill>
-                            <a:latin typeface="Cambria Math" panose="02040503050406030204" pitchFamily="18" charset="0"/>
-                          </a:rPr>
-                          <m:t>𝐱</m:t>
-                        </m:r>
-                      </m:e>
-                      <m:sub>
-                        <m:r>
-                          <a:rPr lang="en-US" smtClean="0">
-                            <a:solidFill>
-                              <a:schemeClr val="tx2">
-                                <a:alpha val="77000"/>
-                              </a:schemeClr>
-                            </a:solidFill>
-                            <a:latin typeface="Cambria Math" panose="02040503050406030204" pitchFamily="18" charset="0"/>
-                          </a:rPr>
-                          <m:t>𝑖</m:t>
-                        </m:r>
-                      </m:sub>
-                    </m:sSub>
-                    <m:r>
-                      <a:rPr lang="en-US" smtClean="0">
-                        <a:solidFill>
-                          <a:schemeClr val="tx2">
-                            <a:alpha val="77000"/>
-                          </a:schemeClr>
-                        </a:solidFill>
-                        <a:latin typeface="Cambria Math" panose="02040503050406030204" pitchFamily="18" charset="0"/>
-                      </a:rPr>
-                      <m:t>= </m:t>
-                    </m:r>
-                    <m:nary>
-                      <m:naryPr>
-                        <m:chr m:val="∑"/>
-                        <m:ctrlPr>
-                          <a:rPr lang="en-US" i="1" smtClean="0">
-                            <a:solidFill>
-                              <a:schemeClr val="tx2">
-                                <a:alpha val="77000"/>
-                              </a:schemeClr>
-                            </a:solidFill>
-                            <a:latin typeface="Cambria Math" panose="02040503050406030204" pitchFamily="18" charset="0"/>
-                          </a:rPr>
-                        </m:ctrlPr>
-                      </m:naryPr>
-                      <m:sub>
-                        <m:r>
-                          <m:rPr>
-                            <m:brk m:alnAt="23"/>
-                          </m:rPr>
-                          <a:rPr lang="en-US" b="0" i="1" smtClean="0">
-                            <a:solidFill>
-                              <a:schemeClr val="tx2">
-                                <a:alpha val="77000"/>
-                              </a:schemeClr>
-                            </a:solidFill>
-                            <a:latin typeface="Cambria Math" panose="02040503050406030204" pitchFamily="18" charset="0"/>
-                          </a:rPr>
-                          <m:t>𝑘</m:t>
-                        </m:r>
-                        <m:r>
-                          <a:rPr lang="en-US" b="0" i="1" smtClean="0">
-                            <a:solidFill>
-                              <a:schemeClr val="tx2">
-                                <a:alpha val="77000"/>
-                              </a:schemeClr>
-                            </a:solidFill>
-                            <a:latin typeface="Cambria Math" panose="02040503050406030204" pitchFamily="18" charset="0"/>
-                          </a:rPr>
-                          <m:t>=1</m:t>
-                        </m:r>
-                      </m:sub>
-                      <m:sup>
-                        <m:r>
-                          <a:rPr lang="en-US" b="0" i="1" smtClean="0">
-                            <a:solidFill>
-                              <a:schemeClr val="tx2">
-                                <a:alpha val="77000"/>
-                              </a:schemeClr>
-                            </a:solidFill>
-                            <a:latin typeface="Cambria Math" panose="02040503050406030204" pitchFamily="18" charset="0"/>
-                          </a:rPr>
-                          <m:t>𝐾</m:t>
-                        </m:r>
-                      </m:sup>
-                      <m:e>
-                        <m:nary>
-                          <m:naryPr>
-                            <m:chr m:val="∑"/>
-                            <m:ctrlPr>
-                              <a:rPr lang="en-US" i="1" smtClean="0">
-                                <a:solidFill>
-                                  <a:schemeClr val="tx2">
-                                    <a:alpha val="77000"/>
-                                  </a:schemeClr>
-                                </a:solidFill>
-                                <a:latin typeface="Cambria Math" panose="02040503050406030204" pitchFamily="18" charset="0"/>
-                              </a:rPr>
-                            </m:ctrlPr>
-                          </m:naryPr>
-                          <m:sub>
-                            <m:r>
-                              <m:rPr>
-                                <m:brk m:alnAt="23"/>
-                              </m:rPr>
-                              <a:rPr lang="en-US" b="0" i="1" smtClean="0">
-                                <a:solidFill>
-                                  <a:schemeClr val="tx2">
-                                    <a:alpha val="77000"/>
-                                  </a:schemeClr>
-                                </a:solidFill>
-                                <a:latin typeface="Cambria Math" panose="02040503050406030204" pitchFamily="18" charset="0"/>
-                              </a:rPr>
-                              <m:t>𝑛</m:t>
-                            </m:r>
-                            <m:r>
-                              <m:rPr>
-                                <m:brk m:alnAt="23"/>
-                              </m:rPr>
-                              <a:rPr lang="en-US" b="0" i="0" smtClean="0">
-                                <a:solidFill>
-                                  <a:schemeClr val="tx2">
-                                    <a:alpha val="77000"/>
-                                  </a:schemeClr>
-                                </a:solidFill>
-                                <a:latin typeface="Cambria Math" panose="02040503050406030204" pitchFamily="18" charset="0"/>
-                              </a:rPr>
-                              <m:t>=</m:t>
-                            </m:r>
-                            <m:r>
-                              <a:rPr lang="en-US" b="0" i="0" smtClean="0">
-                                <a:solidFill>
-                                  <a:schemeClr val="tx2">
-                                    <a:alpha val="77000"/>
-                                  </a:schemeClr>
-                                </a:solidFill>
-                                <a:latin typeface="Cambria Math" panose="02040503050406030204" pitchFamily="18" charset="0"/>
-                              </a:rPr>
-                              <m:t>1</m:t>
-                            </m:r>
-                          </m:sub>
-                          <m:sup>
-                            <m:r>
-                              <a:rPr lang="en-US" b="0" i="1" smtClean="0">
-                                <a:solidFill>
-                                  <a:schemeClr val="tx2">
-                                    <a:alpha val="77000"/>
-                                  </a:schemeClr>
-                                </a:solidFill>
-                                <a:latin typeface="Cambria Math" panose="02040503050406030204" pitchFamily="18" charset="0"/>
-                              </a:rPr>
-                              <m:t>𝑁</m:t>
-                            </m:r>
-                          </m:sup>
-                          <m:e>
-                            <m:sSub>
-                              <m:sSubPr>
-                                <m:ctrlPr>
-                                  <a:rPr lang="en-US" i="1">
-                                    <a:latin typeface="Cambria Math" panose="02040503050406030204" pitchFamily="18" charset="0"/>
-                                  </a:rPr>
-                                </m:ctrlPr>
-                              </m:sSubPr>
-                              <m:e>
-                                <m:r>
-                                  <a:rPr lang="en-US">
-                                    <a:latin typeface="Cambria Math" panose="02040503050406030204" pitchFamily="18" charset="0"/>
-                                  </a:rPr>
-                                  <m:t>𝐬</m:t>
-                                </m:r>
-                              </m:e>
-                              <m:sub>
-                                <m:r>
-                                  <a:rPr lang="en-US">
-                                    <a:latin typeface="Cambria Math" panose="02040503050406030204" pitchFamily="18" charset="0"/>
-                                  </a:rPr>
-                                  <m:t>𝑖</m:t>
-                                </m:r>
-                                <m:r>
-                                  <a:rPr lang="en-US">
-                                    <a:latin typeface="Cambria Math" panose="02040503050406030204" pitchFamily="18" charset="0"/>
-                                  </a:rPr>
-                                  <m:t>,</m:t>
-                                </m:r>
-                                <m:r>
-                                  <a:rPr lang="en-US" b="0" i="1" smtClean="0">
-                                    <a:latin typeface="Cambria Math" panose="02040503050406030204" pitchFamily="18" charset="0"/>
-                                  </a:rPr>
-                                  <m:t>𝑘</m:t>
-                                </m:r>
-                                <m:r>
-                                  <a:rPr lang="en-US" b="0" i="0" smtClean="0">
-                                    <a:latin typeface="Cambria Math" panose="02040503050406030204" pitchFamily="18" charset="0"/>
-                                  </a:rPr>
-                                  <m:t>,</m:t>
-                                </m:r>
-                                <m:r>
-                                  <a:rPr lang="en-US" i="1">
-                                    <a:latin typeface="Cambria Math" panose="02040503050406030204" pitchFamily="18" charset="0"/>
-                                  </a:rPr>
-                                  <m:t>𝑛</m:t>
-                                </m:r>
-                              </m:sub>
-                            </m:sSub>
-                          </m:e>
-                        </m:nary>
-                        <m:r>
-                          <a:rPr lang="en-US" b="0" i="1" smtClean="0">
-                            <a:solidFill>
-                              <a:schemeClr val="tx2">
-                                <a:alpha val="77000"/>
-                              </a:schemeClr>
-                            </a:solidFill>
-                            <a:latin typeface="Cambria Math" panose="02040503050406030204" pitchFamily="18" charset="0"/>
-                          </a:rPr>
-                          <m:t>+</m:t>
-                        </m:r>
-                        <m:sSub>
-                          <m:sSubPr>
-                            <m:ctrlPr>
-                              <a:rPr lang="en-US" b="0" i="1" smtClean="0">
-                                <a:solidFill>
-                                  <a:schemeClr val="tx2">
-                                    <a:alpha val="77000"/>
-                                  </a:schemeClr>
-                                </a:solidFill>
-                                <a:latin typeface="Cambria Math" panose="02040503050406030204" pitchFamily="18" charset="0"/>
-                              </a:rPr>
-                            </m:ctrlPr>
-                          </m:sSubPr>
-                          <m:e>
-                            <m:r>
-                              <a:rPr lang="en-US" b="1" i="0" smtClean="0">
-                                <a:solidFill>
-                                  <a:schemeClr val="tx2">
-                                    <a:alpha val="77000"/>
-                                  </a:schemeClr>
-                                </a:solidFill>
-                                <a:latin typeface="Cambria Math" panose="02040503050406030204" pitchFamily="18" charset="0"/>
-                              </a:rPr>
-                              <m:t>𝐧</m:t>
-                            </m:r>
-                          </m:e>
-                          <m:sub>
-                            <m:r>
-                              <a:rPr lang="en-US" b="0" i="1" smtClean="0">
-                                <a:solidFill>
-                                  <a:schemeClr val="tx2">
-                                    <a:alpha val="77000"/>
-                                  </a:schemeClr>
-                                </a:solidFill>
-                                <a:latin typeface="Cambria Math" panose="02040503050406030204" pitchFamily="18" charset="0"/>
-                              </a:rPr>
-                              <m:t>𝑖</m:t>
-                            </m:r>
-                          </m:sub>
-                        </m:sSub>
-                      </m:e>
-                    </m:nary>
-                  </m:oMath>
-                </a14:m>
-                <a:endParaRPr lang="en-US" dirty="0">
-                  <a:solidFill>
-                    <a:schemeClr val="tx2">
-                      <a:alpha val="77000"/>
-                    </a:schemeClr>
-                  </a:solidFill>
-                </a:endParaRPr>
-              </a:p>
-              <a:p>
                 <a:r>
                   <a:rPr lang="en-US" dirty="0">
                     <a:solidFill>
@@ -14316,11 +14300,11 @@
                       </a:schemeClr>
                     </a:solidFill>
                   </a:rPr>
-                  <a:t>10,000 data samples are made for each source</a:t>
+                  <a:t>10,000 data samples are made for each source </a:t>
                 </a:r>
                 <a:r>
                   <a:rPr lang="en-US" dirty="0"/>
-                  <a:t> (8,000 for training and validation)</a:t>
+                  <a:t>(8,000 for training and validation)</a:t>
                 </a:r>
               </a:p>
               <a:p>
@@ -14339,8 +14323,106 @@
                 <a:pPr lvl="1"/>
                 <a:r>
                   <a:rPr lang="en-US" dirty="0"/>
-                  <a:t>Sample rate = 8,192 Hz (next power of two of two times highest source)</a:t>
+                  <a:t>Sample rate = </a:t>
                 </a:r>
+                <a14:m>
+                  <m:oMath xmlns:m="http://schemas.openxmlformats.org/officeDocument/2006/math">
+                    <m:sSup>
+                      <m:sSupPr>
+                        <m:ctrlPr>
+                          <a:rPr lang="en-US" b="0" i="1" smtClean="0">
+                            <a:latin typeface="Cambria Math" panose="02040503050406030204" pitchFamily="18" charset="0"/>
+                          </a:rPr>
+                        </m:ctrlPr>
+                      </m:sSupPr>
+                      <m:e>
+                        <m:r>
+                          <a:rPr lang="en-US" b="0" i="1" smtClean="0">
+                            <a:latin typeface="Cambria Math" panose="02040503050406030204" pitchFamily="18" charset="0"/>
+                          </a:rPr>
+                          <m:t>2</m:t>
+                        </m:r>
+                      </m:e>
+                      <m:sup>
+                        <m:d>
+                          <m:dPr>
+                            <m:ctrlPr>
+                              <a:rPr lang="en-US" b="0" i="0" smtClean="0">
+                                <a:latin typeface="Cambria Math" panose="02040503050406030204" pitchFamily="18" charset="0"/>
+                              </a:rPr>
+                            </m:ctrlPr>
+                          </m:dPr>
+                          <m:e>
+                            <m:r>
+                              <a:rPr lang="en-US" b="0" i="0" smtClean="0">
+                                <a:latin typeface="Cambria Math" panose="02040503050406030204" pitchFamily="18" charset="0"/>
+                              </a:rPr>
+                              <m:t>2∗</m:t>
+                            </m:r>
+                            <m:func>
+                              <m:funcPr>
+                                <m:ctrlPr>
+                                  <a:rPr lang="en-US" b="0" i="1" smtClean="0">
+                                    <a:latin typeface="Cambria Math" panose="02040503050406030204" pitchFamily="18" charset="0"/>
+                                  </a:rPr>
+                                </m:ctrlPr>
+                              </m:funcPr>
+                              <m:fName>
+                                <m:r>
+                                  <m:rPr>
+                                    <m:sty m:val="p"/>
+                                  </m:rPr>
+                                  <a:rPr lang="en-US" b="0" i="0" smtClean="0">
+                                    <a:latin typeface="Cambria Math" panose="02040503050406030204" pitchFamily="18" charset="0"/>
+                                  </a:rPr>
+                                  <m:t>max</m:t>
+                                </m:r>
+                              </m:fName>
+                              <m:e>
+                                <m:d>
+                                  <m:dPr>
+                                    <m:ctrlPr>
+                                      <a:rPr lang="en-US" b="0" i="1" smtClean="0">
+                                        <a:latin typeface="Cambria Math" panose="02040503050406030204" pitchFamily="18" charset="0"/>
+                                      </a:rPr>
+                                    </m:ctrlPr>
+                                  </m:dPr>
+                                  <m:e>
+                                    <m:r>
+                                      <a:rPr lang="en-US" b="0" i="1" smtClean="0">
+                                        <a:latin typeface="Cambria Math" panose="02040503050406030204" pitchFamily="18" charset="0"/>
+                                      </a:rPr>
+                                      <m:t>𝑓</m:t>
+                                    </m:r>
+                                  </m:e>
+                                </m:d>
+                              </m:e>
+                            </m:func>
+                          </m:e>
+                        </m:d>
+                        <m:r>
+                          <a:rPr lang="en-US" b="0" i="1" smtClean="0">
+                            <a:latin typeface="Cambria Math" panose="02040503050406030204" pitchFamily="18" charset="0"/>
+                          </a:rPr>
+                          <m:t>+1</m:t>
+                        </m:r>
+                      </m:sup>
+                    </m:sSup>
+                    <m:r>
+                      <a:rPr lang="en-US" b="0" i="1" smtClean="0">
+                        <a:latin typeface="Cambria Math" panose="02040503050406030204" pitchFamily="18" charset="0"/>
+                      </a:rPr>
+                      <m:t>=8192 </m:t>
+                    </m:r>
+                    <m:r>
+                      <a:rPr lang="en-US" b="0" i="1" smtClean="0">
+                        <a:latin typeface="Cambria Math" panose="02040503050406030204" pitchFamily="18" charset="0"/>
+                      </a:rPr>
+                      <m:t>𝐻𝑧</m:t>
+                    </m:r>
+                  </m:oMath>
+                </a14:m>
+                <a:endParaRPr lang="en-US" b="0" dirty="0"/>
               </a:p>
               <a:p>
                 <a:pPr lvl="1"/>
@@ -14359,7 +14441,7 @@
             </p:txBody>
           </p:sp>
         </mc:Choice>
-        <mc:Fallback xmlns="">
+        <mc:Fallback>
           <p:sp>
             <p:nvSpPr>
               <p:cNvPr id="3" name="Content Placeholder 2">
@@ -14380,7 +14462,7 @@
               <a:blipFill>
                 <a:blip r:embed="rId2"/>
                 <a:stretch>
-                  <a:fillRect l="-1739" t="-2058"/>
+                  <a:fillRect l="-1739" t="-9443"/>
                 </a:stretch>
               </a:blipFill>
             </p:spPr>
@@ -14524,7 +14606,7 @@
             <a:pPr lvl="1"/>
             <a:r>
               <a:rPr lang="en-US" dirty="0"/>
-              <a:t>Frequency resolution of 1/8,192 Hz</a:t>
+              <a:t>Frequency resolution of 1 Hz</a:t>
             </a:r>
           </a:p>
           <a:p>
@@ -14542,7 +14624,14 @@
           <a:p>
             <a:r>
               <a:rPr lang="en-US" dirty="0"/>
-              <a:t>Frequency domain data is complex which can not be converted to a grayscale image for input into the CNN</a:t>
+              <a:t>Frequency domain data is complex</a:t>
+            </a:r>
+          </a:p>
+          <a:p>
+            <a:pPr lvl="1"/>
+            <a:r>
+              <a:rPr lang="en-US" dirty="0"/>
+              <a:t>Cannot be converted to a grayscale image for input into the CNN</a:t>
             </a:r>
           </a:p>
           <a:p>

</xml_diff>